<commit_message>
um monte de alterações
</commit_message>
<xml_diff>
--- a/Apresentação/Trabalho prático fundamentos de banco de dados 2018.pptx
+++ b/Apresentação/Trabalho prático fundamentos de banco de dados 2018.pptx
@@ -8,6 +8,9 @@
     <p:sldId id="256" r:id="rId2"/>
     <p:sldId id="257" r:id="rId3"/>
     <p:sldId id="258" r:id="rId4"/>
+    <p:sldId id="259" r:id="rId5"/>
+    <p:sldId id="260" r:id="rId6"/>
+    <p:sldId id="261" r:id="rId7"/>
   </p:sldIdLst>
   <p:sldSz cx="12192000" cy="6858000"/>
   <p:notesSz cx="6858000" cy="9144000"/>
@@ -3845,6 +3848,13 @@
   <p:clrMapOvr>
     <a:masterClrMapping/>
   </p:clrMapOvr>
+  <p:timing>
+    <p:tnLst>
+      <p:par>
+        <p:cTn id="1" dur="indefinite" restart="never" nodeType="tmRoot"/>
+      </p:par>
+    </p:tnLst>
+  </p:timing>
 </p:sld>
 </file>
 
@@ -3881,10 +3891,10 @@
           <a:lstStyle/>
           <a:p>
             <a:r>
-              <a:rPr lang="pt-BR" dirty="0" smtClean="0"/>
-              <a:t>Tabela utilizada</a:t>
-            </a:r>
-            <a:endParaRPr lang="pt-BR" dirty="0"/>
+              <a:rPr lang="pt-BR" b="1" dirty="0" smtClean="0"/>
+              <a:t>DADOS UTILIZADOS</a:t>
+            </a:r>
+            <a:endParaRPr lang="pt-BR" b="1" dirty="0"/>
           </a:p>
         </p:txBody>
       </p:sp>
@@ -3978,6 +3988,13 @@
   <p:clrMapOvr>
     <a:masterClrMapping/>
   </p:clrMapOvr>
+  <p:timing>
+    <p:tnLst>
+      <p:par>
+        <p:cTn id="1" dur="indefinite" restart="never" nodeType="tmRoot"/>
+      </p:par>
+    </p:tnLst>
+  </p:timing>
 </p:sld>
 </file>
 
@@ -4014,10 +4031,10 @@
           <a:lstStyle/>
           <a:p>
             <a:r>
-              <a:rPr lang="pt-BR" dirty="0" smtClean="0"/>
-              <a:t>Normalização da tabela</a:t>
-            </a:r>
-            <a:endParaRPr lang="pt-BR" dirty="0"/>
+              <a:rPr lang="pt-BR" b="1" dirty="0" smtClean="0"/>
+              <a:t>NORMALIZAÇÃO</a:t>
+            </a:r>
+            <a:endParaRPr lang="pt-BR" b="1" dirty="0"/>
           </a:p>
         </p:txBody>
       </p:sp>
@@ -4033,8 +4050,8 @@
         </p:nvSpPr>
         <p:spPr>
           <a:xfrm>
-            <a:off x="759655" y="2286000"/>
-            <a:ext cx="11296357" cy="3749040"/>
+            <a:off x="928468" y="2820573"/>
+            <a:ext cx="11099409" cy="583809"/>
           </a:xfrm>
         </p:spPr>
         <p:txBody>
@@ -4058,148 +4075,6 @@
             </a:r>
           </a:p>
           <a:p>
-            <a:pPr marL="0" indent="0" algn="just">
-              <a:buNone/>
-            </a:pPr>
-            <a:r>
-              <a:rPr lang="pt-BR" dirty="0" err="1"/>
-              <a:t>battles</a:t>
-            </a:r>
-            <a:r>
-              <a:rPr lang="pt-BR" dirty="0"/>
-              <a:t>(</a:t>
-            </a:r>
-            <a:r>
-              <a:rPr lang="pt-BR" dirty="0" err="1"/>
-              <a:t>name</a:t>
-            </a:r>
-            <a:r>
-              <a:rPr lang="pt-BR" dirty="0"/>
-              <a:t>, </a:t>
-            </a:r>
-            <a:r>
-              <a:rPr lang="pt-BR" dirty="0" err="1"/>
-              <a:t>year</a:t>
-            </a:r>
-            <a:r>
-              <a:rPr lang="pt-BR" dirty="0"/>
-              <a:t>, </a:t>
-            </a:r>
-            <a:r>
-              <a:rPr lang="pt-BR" b="1" u="sng" dirty="0" err="1"/>
-              <a:t>battle_number</a:t>
-            </a:r>
-            <a:r>
-              <a:rPr lang="pt-BR" dirty="0"/>
-              <a:t>, </a:t>
-            </a:r>
-            <a:r>
-              <a:rPr lang="pt-BR" dirty="0" err="1"/>
-              <a:t>attacker_king</a:t>
-            </a:r>
-            <a:r>
-              <a:rPr lang="pt-BR" dirty="0"/>
-              <a:t>, </a:t>
-            </a:r>
-            <a:r>
-              <a:rPr lang="pt-BR" dirty="0" err="1"/>
-              <a:t>defender_king</a:t>
-            </a:r>
-            <a:r>
-              <a:rPr lang="pt-BR" dirty="0"/>
-              <a:t>, attacker_1, attacker_2, attacker_3, attacker_4, defender_1, defender_2, defender_3, defender_4 , </a:t>
-            </a:r>
-            <a:r>
-              <a:rPr lang="pt-BR" dirty="0" err="1"/>
-              <a:t>attacker_outcome</a:t>
-            </a:r>
-            <a:r>
-              <a:rPr lang="pt-BR" dirty="0"/>
-              <a:t>, </a:t>
-            </a:r>
-            <a:r>
-              <a:rPr lang="pt-BR" dirty="0" err="1"/>
-              <a:t>battle_type</a:t>
-            </a:r>
-            <a:r>
-              <a:rPr lang="pt-BR" dirty="0"/>
-              <a:t>, </a:t>
-            </a:r>
-            <a:r>
-              <a:rPr lang="pt-BR" dirty="0" err="1"/>
-              <a:t>major_death</a:t>
-            </a:r>
-            <a:r>
-              <a:rPr lang="pt-BR" dirty="0"/>
-              <a:t>, </a:t>
-            </a:r>
-            <a:r>
-              <a:rPr lang="pt-BR" dirty="0" err="1"/>
-              <a:t>major_capture</a:t>
-            </a:r>
-            <a:r>
-              <a:rPr lang="pt-BR" dirty="0"/>
-              <a:t>, </a:t>
-            </a:r>
-            <a:r>
-              <a:rPr lang="pt-BR" dirty="0" err="1"/>
-              <a:t>attacker_size</a:t>
-            </a:r>
-            <a:r>
-              <a:rPr lang="pt-BR" dirty="0"/>
-              <a:t>, </a:t>
-            </a:r>
-            <a:r>
-              <a:rPr lang="pt-BR" dirty="0" err="1"/>
-              <a:t>defender_size</a:t>
-            </a:r>
-            <a:r>
-              <a:rPr lang="pt-BR" dirty="0"/>
-              <a:t>, </a:t>
-            </a:r>
-            <a:r>
-              <a:rPr lang="pt-BR" dirty="0" err="1"/>
-              <a:t>attacker_commander</a:t>
-            </a:r>
-            <a:r>
-              <a:rPr lang="pt-BR" dirty="0"/>
-              <a:t>, </a:t>
-            </a:r>
-            <a:r>
-              <a:rPr lang="pt-BR" dirty="0" err="1"/>
-              <a:t>defender_commander</a:t>
-            </a:r>
-            <a:r>
-              <a:rPr lang="pt-BR" dirty="0"/>
-              <a:t>, </a:t>
-            </a:r>
-            <a:r>
-              <a:rPr lang="pt-BR" dirty="0" err="1"/>
-              <a:t>summer</a:t>
-            </a:r>
-            <a:r>
-              <a:rPr lang="pt-BR" dirty="0"/>
-              <a:t>, </a:t>
-            </a:r>
-            <a:r>
-              <a:rPr lang="pt-BR" dirty="0" err="1"/>
-              <a:t>location</a:t>
-            </a:r>
-            <a:r>
-              <a:rPr lang="pt-BR" dirty="0"/>
-              <a:t>, </a:t>
-            </a:r>
-            <a:r>
-              <a:rPr lang="pt-BR" dirty="0" err="1"/>
-              <a:t>region</a:t>
-            </a:r>
-            <a:r>
-              <a:rPr lang="pt-BR" dirty="0"/>
-              <a:t>, note)</a:t>
-            </a:r>
-            <a:endParaRPr lang="pt-BR" dirty="0" smtClean="0"/>
-          </a:p>
-          <a:p>
             <a:pPr marL="0" indent="0">
               <a:buNone/>
             </a:pPr>
@@ -4207,6 +4082,36 @@
           </a:p>
         </p:txBody>
       </p:sp>
+      <p:pic>
+        <p:nvPicPr>
+          <p:cNvPr id="4" name="Imagem 3"/>
+          <p:cNvPicPr>
+            <a:picLocks noChangeAspect="1"/>
+          </p:cNvPicPr>
+          <p:nvPr/>
+        </p:nvPicPr>
+        <p:blipFill>
+          <a:blip r:embed="rId2">
+            <a:extLst>
+              <a:ext uri="{28A0092B-C50C-407E-A947-70E740481C1C}">
+                <a14:useLocalDpi xmlns:a14="http://schemas.microsoft.com/office/drawing/2010/main" val="0"/>
+              </a:ext>
+            </a:extLst>
+          </a:blip>
+          <a:stretch>
+            <a:fillRect/>
+          </a:stretch>
+        </p:blipFill>
+        <p:spPr>
+          <a:xfrm>
+            <a:off x="1371600" y="3842240"/>
+            <a:ext cx="9108280" cy="1756702"/>
+          </a:xfrm>
+          <a:prstGeom prst="rect">
+            <a:avLst/>
+          </a:prstGeom>
+        </p:spPr>
+      </p:pic>
     </p:spTree>
     <p:extLst>
       <p:ext uri="{BB962C8B-B14F-4D97-AF65-F5344CB8AC3E}">
@@ -4217,6 +4122,426 @@
   <p:clrMapOvr>
     <a:masterClrMapping/>
   </p:clrMapOvr>
+  <p:timing>
+    <p:tnLst>
+      <p:par>
+        <p:cTn id="1" dur="indefinite" restart="never" nodeType="tmRoot"/>
+      </p:par>
+    </p:tnLst>
+  </p:timing>
+</p:sld>
+</file>
+
+<file path=ppt/slides/slide4.xml><?xml version="1.0" encoding="utf-8"?>
+<p:sld xmlns:a="http://schemas.openxmlformats.org/drawingml/2006/main" xmlns:r="http://schemas.openxmlformats.org/officeDocument/2006/relationships" xmlns:p="http://schemas.openxmlformats.org/presentationml/2006/main">
+  <p:cSld>
+    <p:spTree>
+      <p:nvGrpSpPr>
+        <p:cNvPr id="1" name=""/>
+        <p:cNvGrpSpPr/>
+        <p:nvPr/>
+      </p:nvGrpSpPr>
+      <p:grpSpPr>
+        <a:xfrm>
+          <a:off x="0" y="0"/>
+          <a:ext cx="0" cy="0"/>
+          <a:chOff x="0" y="0"/>
+          <a:chExt cx="0" cy="0"/>
+        </a:xfrm>
+      </p:grpSpPr>
+      <p:sp>
+        <p:nvSpPr>
+          <p:cNvPr id="2" name="Título 1"/>
+          <p:cNvSpPr>
+            <a:spLocks noGrp="1"/>
+          </p:cNvSpPr>
+          <p:nvPr>
+            <p:ph type="title"/>
+          </p:nvPr>
+        </p:nvSpPr>
+        <p:spPr/>
+        <p:txBody>
+          <a:bodyPr/>
+          <a:lstStyle/>
+          <a:p>
+            <a:r>
+              <a:rPr lang="pt-BR" b="1" dirty="0" smtClean="0"/>
+              <a:t>PRIMEIRA FORMA NORMAL</a:t>
+            </a:r>
+            <a:endParaRPr lang="pt-BR" b="1" dirty="0"/>
+          </a:p>
+        </p:txBody>
+      </p:sp>
+      <p:sp>
+        <p:nvSpPr>
+          <p:cNvPr id="3" name="Espaço Reservado para Conteúdo 2"/>
+          <p:cNvSpPr>
+            <a:spLocks noGrp="1"/>
+          </p:cNvSpPr>
+          <p:nvPr>
+            <p:ph idx="1"/>
+          </p:nvPr>
+        </p:nvSpPr>
+        <p:spPr>
+          <a:xfrm>
+            <a:off x="1259058" y="1640644"/>
+            <a:ext cx="9601200" cy="1062111"/>
+          </a:xfrm>
+        </p:spPr>
+        <p:txBody>
+          <a:bodyPr>
+            <a:normAutofit lnSpcReduction="10000"/>
+          </a:bodyPr>
+          <a:lstStyle/>
+          <a:p>
+            <a:r>
+              <a:rPr lang="pt-BR" dirty="0" smtClean="0"/>
+              <a:t>Modelo 1FN</a:t>
+            </a:r>
+          </a:p>
+          <a:p>
+            <a:pPr lvl="1"/>
+            <a:r>
+              <a:rPr lang="pt-BR" dirty="0" smtClean="0"/>
+              <a:t>“Diz-se que uma tabela está na primeira forma normal, quando ela não contém tabelas aninhadas”</a:t>
+            </a:r>
+            <a:endParaRPr lang="pt-BR" dirty="0"/>
+          </a:p>
+          <a:p>
+            <a:pPr lvl="1"/>
+            <a:endParaRPr lang="pt-BR" dirty="0" smtClean="0"/>
+          </a:p>
+        </p:txBody>
+      </p:sp>
+      <p:sp>
+        <p:nvSpPr>
+          <p:cNvPr id="7" name="CaixaDeTexto 6"/>
+          <p:cNvSpPr txBox="1"/>
+          <p:nvPr/>
+        </p:nvSpPr>
+        <p:spPr>
+          <a:xfrm>
+            <a:off x="1371600" y="2748474"/>
+            <a:ext cx="9687104" cy="646331"/>
+          </a:xfrm>
+          <a:prstGeom prst="rect">
+            <a:avLst/>
+          </a:prstGeom>
+          <a:noFill/>
+        </p:spPr>
+        <p:txBody>
+          <a:bodyPr wrap="square" rtlCol="0">
+            <a:spAutoFit/>
+          </a:bodyPr>
+          <a:lstStyle/>
+          <a:p>
+            <a:pPr algn="just"/>
+            <a:r>
+              <a:rPr lang="pt-BR" dirty="0" smtClean="0"/>
+              <a:t>Durante essa etapa, na tabela, foram identificadas colunas com atributos multivalorados, assim desobedecendo a condição para estar na primeira forma normal.</a:t>
+            </a:r>
+            <a:endParaRPr lang="pt-BR" dirty="0"/>
+          </a:p>
+        </p:txBody>
+      </p:sp>
+      <p:pic>
+        <p:nvPicPr>
+          <p:cNvPr id="12" name="Imagem 11"/>
+          <p:cNvPicPr>
+            <a:picLocks noChangeAspect="1"/>
+          </p:cNvPicPr>
+          <p:nvPr/>
+        </p:nvPicPr>
+        <p:blipFill>
+          <a:blip r:embed="rId2">
+            <a:extLst>
+              <a:ext uri="{28A0092B-C50C-407E-A947-70E740481C1C}">
+                <a14:useLocalDpi xmlns:a14="http://schemas.microsoft.com/office/drawing/2010/main" val="0"/>
+              </a:ext>
+            </a:extLst>
+          </a:blip>
+          <a:stretch>
+            <a:fillRect/>
+          </a:stretch>
+        </p:blipFill>
+        <p:spPr>
+          <a:xfrm>
+            <a:off x="1735357" y="3809412"/>
+            <a:ext cx="8853586" cy="1859868"/>
+          </a:xfrm>
+          <a:prstGeom prst="rect">
+            <a:avLst/>
+          </a:prstGeom>
+        </p:spPr>
+      </p:pic>
+    </p:spTree>
+    <p:extLst>
+      <p:ext uri="{BB962C8B-B14F-4D97-AF65-F5344CB8AC3E}">
+        <p14:creationId xmlns:p14="http://schemas.microsoft.com/office/powerpoint/2010/main" val="632396941"/>
+      </p:ext>
+    </p:extLst>
+  </p:cSld>
+  <p:clrMapOvr>
+    <a:masterClrMapping/>
+  </p:clrMapOvr>
+  <p:timing>
+    <p:tnLst>
+      <p:par>
+        <p:cTn id="1" dur="indefinite" restart="never" nodeType="tmRoot"/>
+      </p:par>
+    </p:tnLst>
+  </p:timing>
+</p:sld>
+</file>
+
+<file path=ppt/slides/slide5.xml><?xml version="1.0" encoding="utf-8"?>
+<p:sld xmlns:a="http://schemas.openxmlformats.org/drawingml/2006/main" xmlns:r="http://schemas.openxmlformats.org/officeDocument/2006/relationships" xmlns:p="http://schemas.openxmlformats.org/presentationml/2006/main">
+  <p:cSld>
+    <p:spTree>
+      <p:nvGrpSpPr>
+        <p:cNvPr id="1" name=""/>
+        <p:cNvGrpSpPr/>
+        <p:nvPr/>
+      </p:nvGrpSpPr>
+      <p:grpSpPr>
+        <a:xfrm>
+          <a:off x="0" y="0"/>
+          <a:ext cx="0" cy="0"/>
+          <a:chOff x="0" y="0"/>
+          <a:chExt cx="0" cy="0"/>
+        </a:xfrm>
+      </p:grpSpPr>
+      <p:sp>
+        <p:nvSpPr>
+          <p:cNvPr id="2" name="Título 1"/>
+          <p:cNvSpPr>
+            <a:spLocks noGrp="1"/>
+          </p:cNvSpPr>
+          <p:nvPr>
+            <p:ph type="title"/>
+          </p:nvPr>
+        </p:nvSpPr>
+        <p:spPr>
+          <a:xfrm>
+            <a:off x="1499815" y="341141"/>
+            <a:ext cx="9601200" cy="663685"/>
+          </a:xfrm>
+        </p:spPr>
+        <p:txBody>
+          <a:bodyPr>
+            <a:normAutofit/>
+          </a:bodyPr>
+          <a:lstStyle/>
+          <a:p>
+            <a:r>
+              <a:rPr lang="pt-BR" sz="3200" b="1" dirty="0" smtClean="0"/>
+              <a:t>COLUNAS COM ATRIBUTOS MULTIVALORADOS</a:t>
+            </a:r>
+            <a:endParaRPr lang="pt-BR" sz="3200" b="1" dirty="0"/>
+          </a:p>
+        </p:txBody>
+      </p:sp>
+      <p:pic>
+        <p:nvPicPr>
+          <p:cNvPr id="4" name="Espaço Reservado para Conteúdo 3"/>
+          <p:cNvPicPr>
+            <a:picLocks noGrp="1" noChangeAspect="1"/>
+          </p:cNvPicPr>
+          <p:nvPr>
+            <p:ph idx="1"/>
+          </p:nvPr>
+        </p:nvPicPr>
+        <p:blipFill>
+          <a:blip r:embed="rId2">
+            <a:extLst>
+              <a:ext uri="{28A0092B-C50C-407E-A947-70E740481C1C}">
+                <a14:useLocalDpi xmlns:a14="http://schemas.microsoft.com/office/drawing/2010/main" val="0"/>
+              </a:ext>
+            </a:extLst>
+          </a:blip>
+          <a:stretch>
+            <a:fillRect/>
+          </a:stretch>
+        </p:blipFill>
+        <p:spPr>
+          <a:xfrm>
+            <a:off x="4434176" y="3778811"/>
+            <a:ext cx="3924887" cy="2903170"/>
+          </a:xfrm>
+        </p:spPr>
+      </p:pic>
+      <p:pic>
+        <p:nvPicPr>
+          <p:cNvPr id="7" name="Imagem 6"/>
+          <p:cNvPicPr>
+            <a:picLocks noChangeAspect="1"/>
+          </p:cNvPicPr>
+          <p:nvPr/>
+        </p:nvPicPr>
+        <p:blipFill>
+          <a:blip r:embed="rId3">
+            <a:extLst>
+              <a:ext uri="{28A0092B-C50C-407E-A947-70E740481C1C}">
+                <a14:useLocalDpi xmlns:a14="http://schemas.microsoft.com/office/drawing/2010/main" val="0"/>
+              </a:ext>
+            </a:extLst>
+          </a:blip>
+          <a:stretch>
+            <a:fillRect/>
+          </a:stretch>
+        </p:blipFill>
+        <p:spPr>
+          <a:xfrm>
+            <a:off x="1499815" y="1096266"/>
+            <a:ext cx="9793611" cy="2499665"/>
+          </a:xfrm>
+          <a:prstGeom prst="rect">
+            <a:avLst/>
+          </a:prstGeom>
+        </p:spPr>
+      </p:pic>
+    </p:spTree>
+    <p:extLst>
+      <p:ext uri="{BB962C8B-B14F-4D97-AF65-F5344CB8AC3E}">
+        <p14:creationId xmlns:p14="http://schemas.microsoft.com/office/powerpoint/2010/main" val="2616301228"/>
+      </p:ext>
+    </p:extLst>
+  </p:cSld>
+  <p:clrMapOvr>
+    <a:masterClrMapping/>
+  </p:clrMapOvr>
+  <p:timing>
+    <p:tnLst>
+      <p:par>
+        <p:cTn id="1" dur="indefinite" restart="never" nodeType="tmRoot"/>
+      </p:par>
+    </p:tnLst>
+  </p:timing>
+</p:sld>
+</file>
+
+<file path=ppt/slides/slide6.xml><?xml version="1.0" encoding="utf-8"?>
+<p:sld xmlns:a="http://schemas.openxmlformats.org/drawingml/2006/main" xmlns:r="http://schemas.openxmlformats.org/officeDocument/2006/relationships" xmlns:p="http://schemas.openxmlformats.org/presentationml/2006/main">
+  <p:cSld>
+    <p:spTree>
+      <p:nvGrpSpPr>
+        <p:cNvPr id="1" name=""/>
+        <p:cNvGrpSpPr/>
+        <p:nvPr/>
+      </p:nvGrpSpPr>
+      <p:grpSpPr>
+        <a:xfrm>
+          <a:off x="0" y="0"/>
+          <a:ext cx="0" cy="0"/>
+          <a:chOff x="0" y="0"/>
+          <a:chExt cx="0" cy="0"/>
+        </a:xfrm>
+      </p:grpSpPr>
+      <p:sp>
+        <p:nvSpPr>
+          <p:cNvPr id="2" name="Título 1"/>
+          <p:cNvSpPr>
+            <a:spLocks noGrp="1"/>
+          </p:cNvSpPr>
+          <p:nvPr>
+            <p:ph type="title"/>
+          </p:nvPr>
+        </p:nvSpPr>
+        <p:spPr/>
+        <p:txBody>
+          <a:bodyPr/>
+          <a:lstStyle/>
+          <a:p>
+            <a:r>
+              <a:rPr lang="pt-BR" b="1" dirty="0" smtClean="0"/>
+              <a:t>PRIMEIRA FORMA NORMAL</a:t>
+            </a:r>
+            <a:endParaRPr lang="pt-BR" b="1" dirty="0"/>
+          </a:p>
+        </p:txBody>
+      </p:sp>
+      <p:sp>
+        <p:nvSpPr>
+          <p:cNvPr id="3" name="Espaço Reservado para Conteúdo 2"/>
+          <p:cNvSpPr>
+            <a:spLocks noGrp="1"/>
+          </p:cNvSpPr>
+          <p:nvPr>
+            <p:ph idx="1"/>
+          </p:nvPr>
+        </p:nvSpPr>
+        <p:spPr>
+          <a:xfrm>
+            <a:off x="1371600" y="1677572"/>
+            <a:ext cx="9601200" cy="400930"/>
+          </a:xfrm>
+        </p:spPr>
+        <p:txBody>
+          <a:bodyPr>
+            <a:normAutofit lnSpcReduction="10000"/>
+          </a:bodyPr>
+          <a:lstStyle/>
+          <a:p>
+            <a:r>
+              <a:rPr lang="pt-BR" dirty="0" smtClean="0"/>
+              <a:t>Solução adotada</a:t>
+            </a:r>
+          </a:p>
+          <a:p>
+            <a:pPr marL="0" indent="0">
+              <a:buNone/>
+            </a:pPr>
+            <a:endParaRPr lang="pt-BR" dirty="0"/>
+          </a:p>
+        </p:txBody>
+      </p:sp>
+      <p:pic>
+        <p:nvPicPr>
+          <p:cNvPr id="8" name="Imagem 7"/>
+          <p:cNvPicPr>
+            <a:picLocks noChangeAspect="1"/>
+          </p:cNvPicPr>
+          <p:nvPr/>
+        </p:nvPicPr>
+        <p:blipFill>
+          <a:blip r:embed="rId2">
+            <a:extLst>
+              <a:ext uri="{28A0092B-C50C-407E-A947-70E740481C1C}">
+                <a14:useLocalDpi xmlns:a14="http://schemas.microsoft.com/office/drawing/2010/main" val="0"/>
+              </a:ext>
+            </a:extLst>
+          </a:blip>
+          <a:stretch>
+            <a:fillRect/>
+          </a:stretch>
+        </p:blipFill>
+        <p:spPr>
+          <a:xfrm>
+            <a:off x="2679191" y="2409092"/>
+            <a:ext cx="6986017" cy="3722886"/>
+          </a:xfrm>
+          <a:prstGeom prst="rect">
+            <a:avLst/>
+          </a:prstGeom>
+        </p:spPr>
+      </p:pic>
+    </p:spTree>
+    <p:extLst>
+      <p:ext uri="{BB962C8B-B14F-4D97-AF65-F5344CB8AC3E}">
+        <p14:creationId xmlns:p14="http://schemas.microsoft.com/office/powerpoint/2010/main" val="3845432864"/>
+      </p:ext>
+    </p:extLst>
+  </p:cSld>
+  <p:clrMapOvr>
+    <a:masterClrMapping/>
+  </p:clrMapOvr>
+  <p:timing>
+    <p:tnLst>
+      <p:par>
+        <p:cTn id="1" dur="indefinite" restart="never" nodeType="tmRoot"/>
+      </p:par>
+    </p:tnLst>
+  </p:timing>
 </p:sld>
 </file>
 

</xml_diff>

<commit_message>
formas normais, falta arrumar slide
</commit_message>
<xml_diff>
--- a/Apresentação/Trabalho prático fundamentos de banco de dados 2018.pptx
+++ b/Apresentação/Trabalho prático fundamentos de banco de dados 2018.pptx
@@ -11,6 +11,9 @@
     <p:sldId id="259" r:id="rId5"/>
     <p:sldId id="260" r:id="rId6"/>
     <p:sldId id="261" r:id="rId7"/>
+    <p:sldId id="262" r:id="rId8"/>
+    <p:sldId id="263" r:id="rId9"/>
+    <p:sldId id="264" r:id="rId10"/>
   </p:sldIdLst>
   <p:sldSz cx="12192000" cy="6858000"/>
   <p:notesSz cx="6858000" cy="9144000"/>
@@ -109,6 +112,11 @@
       </a:defRPr>
     </a:lvl9pPr>
   </p:defaultTextStyle>
+  <p:extLst>
+    <p:ext uri="{EFAFB233-063F-42B5-8137-9DF3F51BA10A}">
+      <p15:sldGuideLst xmlns:p15="http://schemas.microsoft.com/office/powerpoint/2012/main"/>
+    </p:ext>
+  </p:extLst>
 </p:presentation>
 </file>
 
@@ -282,7 +290,7 @@
             <a:fld id="{87DE6118-2437-4B30-8E3C-4D2BE6020583}" type="datetimeFigureOut">
               <a:rPr lang="en-US" dirty="0"/>
               <a:pPr/>
-              <a:t>6/17/2018</a:t>
+              <a:t>6/18/2018</a:t>
             </a:fld>
             <a:endParaRPr lang="en-US" dirty="0"/>
           </a:p>
@@ -608,7 +616,7 @@
           <a:p>
             <a:fld id="{87DE6118-2437-4B30-8E3C-4D2BE6020583}" type="datetimeFigureOut">
               <a:rPr lang="en-US" dirty="0"/>
-              <a:t>6/17/2018</a:t>
+              <a:t>6/18/2018</a:t>
             </a:fld>
             <a:endParaRPr lang="en-US" dirty="0"/>
           </a:p>
@@ -783,7 +791,7 @@
           <a:p>
             <a:fld id="{87DE6118-2437-4B30-8E3C-4D2BE6020583}" type="datetimeFigureOut">
               <a:rPr lang="en-US" dirty="0"/>
-              <a:t>6/17/2018</a:t>
+              <a:t>6/18/2018</a:t>
             </a:fld>
             <a:endParaRPr lang="en-US" dirty="0"/>
           </a:p>
@@ -948,7 +956,7 @@
           <a:p>
             <a:fld id="{87DE6118-2437-4B30-8E3C-4D2BE6020583}" type="datetimeFigureOut">
               <a:rPr lang="en-US" dirty="0"/>
-              <a:t>6/17/2018</a:t>
+              <a:t>6/18/2018</a:t>
             </a:fld>
             <a:endParaRPr lang="en-US" dirty="0"/>
           </a:p>
@@ -1221,7 +1229,7 @@
             <a:fld id="{87DE6118-2437-4B30-8E3C-4D2BE6020583}" type="datetimeFigureOut">
               <a:rPr lang="en-US" dirty="0"/>
               <a:pPr/>
-              <a:t>6/17/2018</a:t>
+              <a:t>6/18/2018</a:t>
             </a:fld>
             <a:endParaRPr lang="en-US" dirty="0"/>
           </a:p>
@@ -1611,7 +1619,7 @@
           <a:p>
             <a:fld id="{87DE6118-2437-4B30-8E3C-4D2BE6020583}" type="datetimeFigureOut">
               <a:rPr lang="en-US" dirty="0"/>
-              <a:t>6/17/2018</a:t>
+              <a:t>6/18/2018</a:t>
             </a:fld>
             <a:endParaRPr lang="en-US" dirty="0"/>
           </a:p>
@@ -2083,7 +2091,7 @@
           <a:p>
             <a:fld id="{87DE6118-2437-4B30-8E3C-4D2BE6020583}" type="datetimeFigureOut">
               <a:rPr lang="en-US" dirty="0"/>
-              <a:t>6/17/2018</a:t>
+              <a:t>6/18/2018</a:t>
             </a:fld>
             <a:endParaRPr lang="en-US" dirty="0"/>
           </a:p>
@@ -2196,7 +2204,7 @@
           <a:p>
             <a:fld id="{87DE6118-2437-4B30-8E3C-4D2BE6020583}" type="datetimeFigureOut">
               <a:rPr lang="en-US" dirty="0"/>
-              <a:t>6/17/2018</a:t>
+              <a:t>6/18/2018</a:t>
             </a:fld>
             <a:endParaRPr lang="en-US" dirty="0"/>
           </a:p>
@@ -2286,7 +2294,7 @@
           <a:p>
             <a:fld id="{87DE6118-2437-4B30-8E3C-4D2BE6020583}" type="datetimeFigureOut">
               <a:rPr lang="en-US" dirty="0"/>
-              <a:t>6/17/2018</a:t>
+              <a:t>6/18/2018</a:t>
             </a:fld>
             <a:endParaRPr lang="en-US" dirty="0"/>
           </a:p>
@@ -2628,7 +2636,7 @@
             <a:fld id="{87DE6118-2437-4B30-8E3C-4D2BE6020583}" type="datetimeFigureOut">
               <a:rPr lang="en-US" dirty="0"/>
               <a:pPr/>
-              <a:t>6/17/2018</a:t>
+              <a:t>6/18/2018</a:t>
             </a:fld>
             <a:endParaRPr lang="en-US" dirty="0"/>
           </a:p>
@@ -3013,7 +3021,7 @@
             <a:fld id="{87DE6118-2437-4B30-8E3C-4D2BE6020583}" type="datetimeFigureOut">
               <a:rPr lang="en-US" dirty="0"/>
               <a:pPr/>
-              <a:t>6/17/2018</a:t>
+              <a:t>6/18/2018</a:t>
             </a:fld>
             <a:endParaRPr lang="en-US" dirty="0"/>
           </a:p>
@@ -3288,7 +3296,7 @@
             <a:fld id="{87DE6118-2437-4B30-8E3C-4D2BE6020583}" type="datetimeFigureOut">
               <a:rPr lang="en-US" dirty="0"/>
               <a:pPr/>
-              <a:t>6/17/2018</a:t>
+              <a:t>6/18/2018</a:t>
             </a:fld>
             <a:endParaRPr lang="en-US" dirty="0"/>
           </a:p>
@@ -4184,13 +4192,13 @@
         </p:nvSpPr>
         <p:spPr>
           <a:xfrm>
-            <a:off x="1259058" y="1640644"/>
-            <a:ext cx="9601200" cy="1062111"/>
+            <a:off x="1259058" y="1473200"/>
+            <a:ext cx="9601200" cy="1229555"/>
           </a:xfrm>
         </p:spPr>
         <p:txBody>
           <a:bodyPr>
-            <a:normAutofit lnSpcReduction="10000"/>
+            <a:normAutofit fontScale="77500" lnSpcReduction="20000"/>
           </a:bodyPr>
           <a:lstStyle/>
           <a:p>
@@ -4203,7 +4211,20 @@
             <a:pPr lvl="1"/>
             <a:r>
               <a:rPr lang="pt-BR" dirty="0" smtClean="0"/>
-              <a:t>“Diz-se que uma tabela está na primeira forma normal, quando ela não contém tabelas aninhadas”</a:t>
+              <a:t>“Diz-se que uma tabela está na primeira forma normal, quando ela não contém tabelas aninhadas</a:t>
+            </a:r>
+            <a:r>
+              <a:rPr lang="pt-BR" dirty="0" smtClean="0"/>
+              <a:t>”</a:t>
+            </a:r>
+          </a:p>
+          <a:p>
+            <a:pPr marL="530352" lvl="1" indent="0">
+              <a:buNone/>
+            </a:pPr>
+            <a:r>
+              <a:rPr lang="pt-BR" dirty="0" smtClean="0"/>
+              <a:t>-Todos os atributos devem sem atômicos ou seja a tabela não deve conter grupos repetidos e nem atributos com mais de um valor.</a:t>
             </a:r>
             <a:endParaRPr lang="pt-BR" dirty="0"/>
           </a:p>
@@ -4495,9 +4516,153 @@
           </a:p>
         </p:txBody>
       </p:sp>
+    </p:spTree>
+    <p:extLst>
+      <p:ext uri="{BB962C8B-B14F-4D97-AF65-F5344CB8AC3E}">
+        <p14:creationId xmlns:p14="http://schemas.microsoft.com/office/powerpoint/2010/main" val="3845432864"/>
+      </p:ext>
+    </p:extLst>
+  </p:cSld>
+  <p:clrMapOvr>
+    <a:masterClrMapping/>
+  </p:clrMapOvr>
+  <p:timing>
+    <p:tnLst>
+      <p:par>
+        <p:cTn id="1" dur="indefinite" restart="never" nodeType="tmRoot"/>
+      </p:par>
+    </p:tnLst>
+  </p:timing>
+</p:sld>
+</file>
+
+<file path=ppt/slides/slide7.xml><?xml version="1.0" encoding="utf-8"?>
+<p:sld xmlns:a="http://schemas.openxmlformats.org/drawingml/2006/main" xmlns:r="http://schemas.openxmlformats.org/officeDocument/2006/relationships" xmlns:p="http://schemas.openxmlformats.org/presentationml/2006/main">
+  <p:cSld>
+    <p:spTree>
+      <p:nvGrpSpPr>
+        <p:cNvPr id="1" name=""/>
+        <p:cNvGrpSpPr/>
+        <p:nvPr/>
+      </p:nvGrpSpPr>
+      <p:grpSpPr>
+        <a:xfrm>
+          <a:off x="0" y="0"/>
+          <a:ext cx="0" cy="0"/>
+          <a:chOff x="0" y="0"/>
+          <a:chExt cx="0" cy="0"/>
+        </a:xfrm>
+      </p:grpSpPr>
+      <p:sp>
+        <p:nvSpPr>
+          <p:cNvPr id="2" name="Título 1"/>
+          <p:cNvSpPr>
+            <a:spLocks noGrp="1"/>
+          </p:cNvSpPr>
+          <p:nvPr>
+            <p:ph type="title"/>
+          </p:nvPr>
+        </p:nvSpPr>
+        <p:spPr/>
+        <p:txBody>
+          <a:bodyPr/>
+          <a:lstStyle/>
+          <a:p>
+            <a:r>
+              <a:rPr lang="pt-BR" dirty="0" smtClean="0"/>
+              <a:t>SEGUNDA FORMA NORMAL</a:t>
+            </a:r>
+            <a:endParaRPr lang="pt-BR" dirty="0"/>
+          </a:p>
+        </p:txBody>
+      </p:sp>
+      <p:sp>
+        <p:nvSpPr>
+          <p:cNvPr id="3" name="Espaço Reservado para Conteúdo 2"/>
+          <p:cNvSpPr>
+            <a:spLocks noGrp="1"/>
+          </p:cNvSpPr>
+          <p:nvPr>
+            <p:ph idx="1"/>
+          </p:nvPr>
+        </p:nvSpPr>
+        <p:spPr>
+          <a:xfrm>
+            <a:off x="1270000" y="1428750"/>
+            <a:ext cx="9601200" cy="2044700"/>
+          </a:xfrm>
+        </p:spPr>
+        <p:txBody>
+          <a:bodyPr/>
+          <a:lstStyle/>
+          <a:p>
+            <a:r>
+              <a:rPr lang="pt-BR" dirty="0" smtClean="0"/>
+              <a:t>Modelo 2FN</a:t>
+            </a:r>
+          </a:p>
+          <a:p>
+            <a:pPr lvl="1"/>
+            <a:r>
+              <a:rPr lang="pt-BR" dirty="0" smtClean="0"/>
+              <a:t>“Uma tabela encontra-se na segunda forma normal, quando, além de estar na 1FN, não contém dependências parciais.”</a:t>
+            </a:r>
+          </a:p>
+          <a:p>
+            <a:pPr lvl="1"/>
+            <a:r>
+              <a:rPr lang="pt-BR" dirty="0" smtClean="0"/>
+              <a:t>“Dependências parciais ocorrem quando uma coluna depende apenas de parte de uma chave primária composta.”</a:t>
+            </a:r>
+          </a:p>
+        </p:txBody>
+      </p:sp>
+      <p:sp>
+        <p:nvSpPr>
+          <p:cNvPr id="5" name="Smiley 4"/>
+          <p:cNvSpPr/>
+          <p:nvPr/>
+        </p:nvSpPr>
+        <p:spPr>
+          <a:xfrm>
+            <a:off x="9697985" y="3180402"/>
+            <a:ext cx="914400" cy="914400"/>
+          </a:xfrm>
+          <a:prstGeom prst="smileyFace">
+            <a:avLst/>
+          </a:prstGeom>
+          <a:solidFill>
+            <a:srgbClr val="92D050"/>
+          </a:solidFill>
+        </p:spPr>
+        <p:style>
+          <a:lnRef idx="2">
+            <a:schemeClr val="accent1">
+              <a:shade val="50000"/>
+            </a:schemeClr>
+          </a:lnRef>
+          <a:fillRef idx="1">
+            <a:schemeClr val="accent1"/>
+          </a:fillRef>
+          <a:effectRef idx="0">
+            <a:schemeClr val="accent1"/>
+          </a:effectRef>
+          <a:fontRef idx="minor">
+            <a:schemeClr val="lt1"/>
+          </a:fontRef>
+        </p:style>
+        <p:txBody>
+          <a:bodyPr rtlCol="0" anchor="ctr"/>
+          <a:lstStyle/>
+          <a:p>
+            <a:pPr algn="ctr"/>
+            <a:endParaRPr lang="pt-BR"/>
+          </a:p>
+        </p:txBody>
+      </p:sp>
       <p:pic>
         <p:nvPicPr>
-          <p:cNvPr id="8" name="Imagem 7"/>
+          <p:cNvPr id="6" name="Imagem 5"/>
           <p:cNvPicPr>
             <a:picLocks noChangeAspect="1"/>
           </p:cNvPicPr>
@@ -4517,18 +4682,577 @@
         </p:blipFill>
         <p:spPr>
           <a:xfrm>
-            <a:off x="2679191" y="2409092"/>
-            <a:ext cx="6986017" cy="3722886"/>
+            <a:off x="3343563" y="4300621"/>
+            <a:ext cx="5439534" cy="2429214"/>
           </a:xfrm>
           <a:prstGeom prst="rect">
             <a:avLst/>
           </a:prstGeom>
         </p:spPr>
       </p:pic>
+      <p:sp>
+        <p:nvSpPr>
+          <p:cNvPr id="7" name="Smiley 6"/>
+          <p:cNvSpPr/>
+          <p:nvPr/>
+        </p:nvSpPr>
+        <p:spPr>
+          <a:xfrm>
+            <a:off x="9187530" y="5058028"/>
+            <a:ext cx="914400" cy="914400"/>
+          </a:xfrm>
+          <a:prstGeom prst="smileyFace">
+            <a:avLst>
+              <a:gd name="adj" fmla="val -4653"/>
+            </a:avLst>
+          </a:prstGeom>
+          <a:solidFill>
+            <a:srgbClr val="C00000"/>
+          </a:solidFill>
+          <a:ln>
+            <a:solidFill>
+              <a:schemeClr val="tx1"/>
+            </a:solidFill>
+          </a:ln>
+        </p:spPr>
+        <p:style>
+          <a:lnRef idx="2">
+            <a:schemeClr val="accent1">
+              <a:shade val="50000"/>
+            </a:schemeClr>
+          </a:lnRef>
+          <a:fillRef idx="1">
+            <a:schemeClr val="accent1"/>
+          </a:fillRef>
+          <a:effectRef idx="0">
+            <a:schemeClr val="accent1"/>
+          </a:effectRef>
+          <a:fontRef idx="minor">
+            <a:schemeClr val="lt1"/>
+          </a:fontRef>
+        </p:style>
+        <p:txBody>
+          <a:bodyPr rtlCol="0" anchor="ctr"/>
+          <a:lstStyle/>
+          <a:p>
+            <a:pPr algn="ctr"/>
+            <a:endParaRPr lang="pt-BR"/>
+          </a:p>
+        </p:txBody>
+      </p:sp>
     </p:spTree>
     <p:extLst>
       <p:ext uri="{BB962C8B-B14F-4D97-AF65-F5344CB8AC3E}">
-        <p14:creationId xmlns:p14="http://schemas.microsoft.com/office/powerpoint/2010/main" val="3845432864"/>
+        <p14:creationId xmlns:p14="http://schemas.microsoft.com/office/powerpoint/2010/main" val="1644116460"/>
+      </p:ext>
+    </p:extLst>
+  </p:cSld>
+  <p:clrMapOvr>
+    <a:masterClrMapping/>
+  </p:clrMapOvr>
+  <p:timing>
+    <p:tnLst>
+      <p:par>
+        <p:cTn id="1" dur="indefinite" restart="never" nodeType="tmRoot"/>
+      </p:par>
+    </p:tnLst>
+  </p:timing>
+</p:sld>
+</file>
+
+<file path=ppt/slides/slide8.xml><?xml version="1.0" encoding="utf-8"?>
+<p:sld xmlns:a="http://schemas.openxmlformats.org/drawingml/2006/main" xmlns:r="http://schemas.openxmlformats.org/officeDocument/2006/relationships" xmlns:p="http://schemas.openxmlformats.org/presentationml/2006/main">
+  <p:cSld>
+    <p:spTree>
+      <p:nvGrpSpPr>
+        <p:cNvPr id="1" name=""/>
+        <p:cNvGrpSpPr/>
+        <p:nvPr/>
+      </p:nvGrpSpPr>
+      <p:grpSpPr>
+        <a:xfrm>
+          <a:off x="0" y="0"/>
+          <a:ext cx="0" cy="0"/>
+          <a:chOff x="0" y="0"/>
+          <a:chExt cx="0" cy="0"/>
+        </a:xfrm>
+      </p:grpSpPr>
+      <p:sp>
+        <p:nvSpPr>
+          <p:cNvPr id="2" name="Título 1"/>
+          <p:cNvSpPr>
+            <a:spLocks noGrp="1"/>
+          </p:cNvSpPr>
+          <p:nvPr>
+            <p:ph type="title"/>
+          </p:nvPr>
+        </p:nvSpPr>
+        <p:spPr/>
+        <p:txBody>
+          <a:bodyPr/>
+          <a:lstStyle/>
+          <a:p>
+            <a:pPr algn="ctr"/>
+            <a:r>
+              <a:rPr lang="pt-BR" dirty="0" smtClean="0"/>
+              <a:t>SEGUNDA FORMA NORMAL</a:t>
+            </a:r>
+            <a:endParaRPr lang="pt-BR" dirty="0"/>
+          </a:p>
+        </p:txBody>
+      </p:sp>
+      <p:grpSp>
+        <p:nvGrpSpPr>
+          <p:cNvPr id="34" name="Agrupar 33"/>
+          <p:cNvGrpSpPr/>
+          <p:nvPr/>
+        </p:nvGrpSpPr>
+        <p:grpSpPr>
+          <a:xfrm>
+            <a:off x="3593262" y="1643014"/>
+            <a:ext cx="5059254" cy="1205255"/>
+            <a:chOff x="1371600" y="1689821"/>
+            <a:chExt cx="4045527" cy="963757"/>
+          </a:xfrm>
+        </p:grpSpPr>
+        <p:pic>
+          <p:nvPicPr>
+            <p:cNvPr id="8" name="Imagem 7"/>
+            <p:cNvPicPr>
+              <a:picLocks noChangeAspect="1"/>
+            </p:cNvPicPr>
+            <p:nvPr/>
+          </p:nvPicPr>
+          <p:blipFill rotWithShape="1">
+            <a:blip r:embed="rId2">
+              <a:extLst>
+                <a:ext uri="{28A0092B-C50C-407E-A947-70E740481C1C}">
+                  <a14:useLocalDpi xmlns:a14="http://schemas.microsoft.com/office/drawing/2010/main" val="0"/>
+                </a:ext>
+              </a:extLst>
+            </a:blip>
+            <a:srcRect l="14122" t="29828" r="19829" b="36532"/>
+            <a:stretch/>
+          </p:blipFill>
+          <p:spPr>
+            <a:xfrm>
+              <a:off x="1371600" y="1689821"/>
+              <a:ext cx="4045527" cy="963757"/>
+            </a:xfrm>
+            <a:prstGeom prst="rect">
+              <a:avLst/>
+            </a:prstGeom>
+          </p:spPr>
+        </p:pic>
+        <p:sp>
+          <p:nvSpPr>
+            <p:cNvPr id="22" name="Retângulo 21"/>
+            <p:cNvSpPr/>
+            <p:nvPr/>
+          </p:nvSpPr>
+          <p:spPr>
+            <a:xfrm>
+              <a:off x="3731014" y="1852067"/>
+              <a:ext cx="1551429" cy="347530"/>
+            </a:xfrm>
+            <a:prstGeom prst="rect">
+              <a:avLst/>
+            </a:prstGeom>
+            <a:noFill/>
+            <a:ln>
+              <a:solidFill>
+                <a:srgbClr val="FF0000"/>
+              </a:solidFill>
+            </a:ln>
+          </p:spPr>
+          <p:style>
+            <a:lnRef idx="2">
+              <a:schemeClr val="accent1">
+                <a:shade val="50000"/>
+              </a:schemeClr>
+            </a:lnRef>
+            <a:fillRef idx="1">
+              <a:schemeClr val="accent1"/>
+            </a:fillRef>
+            <a:effectRef idx="0">
+              <a:schemeClr val="accent1"/>
+            </a:effectRef>
+            <a:fontRef idx="minor">
+              <a:schemeClr val="lt1"/>
+            </a:fontRef>
+          </p:style>
+          <p:txBody>
+            <a:bodyPr rtlCol="0" anchor="ctr"/>
+            <a:lstStyle/>
+            <a:p>
+              <a:pPr algn="ctr"/>
+              <a:endParaRPr lang="pt-BR"/>
+            </a:p>
+          </p:txBody>
+        </p:sp>
+      </p:grpSp>
+      <p:grpSp>
+        <p:nvGrpSpPr>
+          <p:cNvPr id="28" name="Agrupar 27"/>
+          <p:cNvGrpSpPr/>
+          <p:nvPr/>
+        </p:nvGrpSpPr>
+        <p:grpSpPr>
+          <a:xfrm>
+            <a:off x="3581350" y="3026229"/>
+            <a:ext cx="5086327" cy="851327"/>
+            <a:chOff x="1362075" y="2795880"/>
+            <a:chExt cx="4067176" cy="680746"/>
+          </a:xfrm>
+        </p:grpSpPr>
+        <p:pic>
+          <p:nvPicPr>
+            <p:cNvPr id="25" name="Imagem 24"/>
+            <p:cNvPicPr>
+              <a:picLocks noChangeAspect="1"/>
+            </p:cNvPicPr>
+            <p:nvPr/>
+          </p:nvPicPr>
+          <p:blipFill rotWithShape="1">
+            <a:blip r:embed="rId3">
+              <a:extLst>
+                <a:ext uri="{28A0092B-C50C-407E-A947-70E740481C1C}">
+                  <a14:useLocalDpi xmlns:a14="http://schemas.microsoft.com/office/drawing/2010/main" val="0"/>
+                </a:ext>
+              </a:extLst>
+            </a:blip>
+            <a:srcRect l="2934" t="25143" r="28671" b="49762"/>
+            <a:stretch/>
+          </p:blipFill>
+          <p:spPr>
+            <a:xfrm>
+              <a:off x="1362075" y="2810195"/>
+              <a:ext cx="4067176" cy="666431"/>
+            </a:xfrm>
+            <a:prstGeom prst="rect">
+              <a:avLst/>
+            </a:prstGeom>
+          </p:spPr>
+        </p:pic>
+        <p:sp>
+          <p:nvSpPr>
+            <p:cNvPr id="26" name="Retângulo 25"/>
+            <p:cNvSpPr/>
+            <p:nvPr/>
+          </p:nvSpPr>
+          <p:spPr>
+            <a:xfrm>
+              <a:off x="3731013" y="2795880"/>
+              <a:ext cx="1551429" cy="347530"/>
+            </a:xfrm>
+            <a:prstGeom prst="rect">
+              <a:avLst/>
+            </a:prstGeom>
+            <a:noFill/>
+            <a:ln>
+              <a:solidFill>
+                <a:srgbClr val="FF0000"/>
+              </a:solidFill>
+            </a:ln>
+          </p:spPr>
+          <p:style>
+            <a:lnRef idx="2">
+              <a:schemeClr val="accent1">
+                <a:shade val="50000"/>
+              </a:schemeClr>
+            </a:lnRef>
+            <a:fillRef idx="1">
+              <a:schemeClr val="accent1"/>
+            </a:fillRef>
+            <a:effectRef idx="0">
+              <a:schemeClr val="accent1"/>
+            </a:effectRef>
+            <a:fontRef idx="minor">
+              <a:schemeClr val="lt1"/>
+            </a:fontRef>
+          </p:style>
+          <p:txBody>
+            <a:bodyPr rtlCol="0" anchor="ctr"/>
+            <a:lstStyle/>
+            <a:p>
+              <a:pPr algn="ctr"/>
+              <a:endParaRPr lang="pt-BR"/>
+            </a:p>
+          </p:txBody>
+        </p:sp>
+      </p:grpSp>
+      <p:grpSp>
+        <p:nvGrpSpPr>
+          <p:cNvPr id="32" name="Agrupar 31"/>
+          <p:cNvGrpSpPr/>
+          <p:nvPr/>
+        </p:nvGrpSpPr>
+        <p:grpSpPr>
+          <a:xfrm>
+            <a:off x="2785693" y="4198964"/>
+            <a:ext cx="7016034" cy="845371"/>
+            <a:chOff x="1371600" y="3638522"/>
+            <a:chExt cx="5610226" cy="675983"/>
+          </a:xfrm>
+        </p:grpSpPr>
+        <p:pic>
+          <p:nvPicPr>
+            <p:cNvPr id="27" name="Imagem 26"/>
+            <p:cNvPicPr>
+              <a:picLocks noChangeAspect="1"/>
+            </p:cNvPicPr>
+            <p:nvPr/>
+          </p:nvPicPr>
+          <p:blipFill rotWithShape="1">
+            <a:blip r:embed="rId3">
+              <a:extLst>
+                <a:ext uri="{28A0092B-C50C-407E-A947-70E740481C1C}">
+                  <a14:useLocalDpi xmlns:a14="http://schemas.microsoft.com/office/drawing/2010/main" val="0"/>
+                </a:ext>
+              </a:extLst>
+            </a:blip>
+            <a:srcRect l="2925" t="49777" r="1363" b="25128"/>
+            <a:stretch/>
+          </p:blipFill>
+          <p:spPr>
+            <a:xfrm>
+              <a:off x="1371600" y="3657599"/>
+              <a:ext cx="5610226" cy="656906"/>
+            </a:xfrm>
+            <a:prstGeom prst="rect">
+              <a:avLst/>
+            </a:prstGeom>
+          </p:spPr>
+        </p:pic>
+        <p:sp>
+          <p:nvSpPr>
+            <p:cNvPr id="30" name="Retângulo 29"/>
+            <p:cNvSpPr/>
+            <p:nvPr/>
+          </p:nvSpPr>
+          <p:spPr>
+            <a:xfrm>
+              <a:off x="4245364" y="3638522"/>
+              <a:ext cx="2536436" cy="347530"/>
+            </a:xfrm>
+            <a:prstGeom prst="rect">
+              <a:avLst/>
+            </a:prstGeom>
+            <a:noFill/>
+            <a:ln>
+              <a:solidFill>
+                <a:srgbClr val="FF0000"/>
+              </a:solidFill>
+            </a:ln>
+          </p:spPr>
+          <p:style>
+            <a:lnRef idx="2">
+              <a:schemeClr val="accent1">
+                <a:shade val="50000"/>
+              </a:schemeClr>
+            </a:lnRef>
+            <a:fillRef idx="1">
+              <a:schemeClr val="accent1"/>
+            </a:fillRef>
+            <a:effectRef idx="0">
+              <a:schemeClr val="accent1"/>
+            </a:effectRef>
+            <a:fontRef idx="minor">
+              <a:schemeClr val="lt1"/>
+            </a:fontRef>
+          </p:style>
+          <p:txBody>
+            <a:bodyPr rtlCol="0" anchor="ctr"/>
+            <a:lstStyle/>
+            <a:p>
+              <a:pPr algn="ctr"/>
+              <a:endParaRPr lang="pt-BR"/>
+            </a:p>
+          </p:txBody>
+        </p:sp>
+      </p:grpSp>
+      <p:grpSp>
+        <p:nvGrpSpPr>
+          <p:cNvPr id="33" name="Agrupar 32"/>
+          <p:cNvGrpSpPr/>
+          <p:nvPr/>
+        </p:nvGrpSpPr>
+        <p:grpSpPr>
+          <a:xfrm>
+            <a:off x="2773781" y="5220715"/>
+            <a:ext cx="7027946" cy="866829"/>
+            <a:chOff x="1362075" y="4455544"/>
+            <a:chExt cx="5619751" cy="693142"/>
+          </a:xfrm>
+        </p:grpSpPr>
+        <p:pic>
+          <p:nvPicPr>
+            <p:cNvPr id="29" name="Imagem 28"/>
+            <p:cNvPicPr>
+              <a:picLocks noChangeAspect="1"/>
+            </p:cNvPicPr>
+            <p:nvPr/>
+          </p:nvPicPr>
+          <p:blipFill rotWithShape="1">
+            <a:blip r:embed="rId3">
+              <a:extLst>
+                <a:ext uri="{28A0092B-C50C-407E-A947-70E740481C1C}">
+                  <a14:useLocalDpi xmlns:a14="http://schemas.microsoft.com/office/drawing/2010/main" val="0"/>
+                </a:ext>
+              </a:extLst>
+            </a:blip>
+            <a:srcRect l="2640" t="74660"/>
+            <a:stretch/>
+          </p:blipFill>
+          <p:spPr>
+            <a:xfrm>
+              <a:off x="1362075" y="4495479"/>
+              <a:ext cx="5619751" cy="653207"/>
+            </a:xfrm>
+            <a:prstGeom prst="rect">
+              <a:avLst/>
+            </a:prstGeom>
+          </p:spPr>
+        </p:pic>
+        <p:sp>
+          <p:nvSpPr>
+            <p:cNvPr id="31" name="Retângulo 30"/>
+            <p:cNvSpPr/>
+            <p:nvPr/>
+          </p:nvSpPr>
+          <p:spPr>
+            <a:xfrm>
+              <a:off x="4245364" y="4455544"/>
+              <a:ext cx="2536436" cy="347530"/>
+            </a:xfrm>
+            <a:prstGeom prst="rect">
+              <a:avLst/>
+            </a:prstGeom>
+            <a:noFill/>
+            <a:ln>
+              <a:solidFill>
+                <a:srgbClr val="FF0000"/>
+              </a:solidFill>
+            </a:ln>
+          </p:spPr>
+          <p:style>
+            <a:lnRef idx="2">
+              <a:schemeClr val="accent1">
+                <a:shade val="50000"/>
+              </a:schemeClr>
+            </a:lnRef>
+            <a:fillRef idx="1">
+              <a:schemeClr val="accent1"/>
+            </a:fillRef>
+            <a:effectRef idx="0">
+              <a:schemeClr val="accent1"/>
+            </a:effectRef>
+            <a:fontRef idx="minor">
+              <a:schemeClr val="lt1"/>
+            </a:fontRef>
+          </p:style>
+          <p:txBody>
+            <a:bodyPr rtlCol="0" anchor="ctr"/>
+            <a:lstStyle/>
+            <a:p>
+              <a:pPr algn="ctr"/>
+              <a:endParaRPr lang="pt-BR"/>
+            </a:p>
+          </p:txBody>
+        </p:sp>
+      </p:grpSp>
+    </p:spTree>
+    <p:extLst>
+      <p:ext uri="{BB962C8B-B14F-4D97-AF65-F5344CB8AC3E}">
+        <p14:creationId xmlns:p14="http://schemas.microsoft.com/office/powerpoint/2010/main" val="1069438054"/>
+      </p:ext>
+    </p:extLst>
+  </p:cSld>
+  <p:clrMapOvr>
+    <a:masterClrMapping/>
+  </p:clrMapOvr>
+  <p:timing>
+    <p:tnLst>
+      <p:par>
+        <p:cTn id="1" dur="indefinite" restart="never" nodeType="tmRoot"/>
+      </p:par>
+    </p:tnLst>
+  </p:timing>
+</p:sld>
+</file>
+
+<file path=ppt/slides/slide9.xml><?xml version="1.0" encoding="utf-8"?>
+<p:sld xmlns:a="http://schemas.openxmlformats.org/drawingml/2006/main" xmlns:r="http://schemas.openxmlformats.org/officeDocument/2006/relationships" xmlns:p="http://schemas.openxmlformats.org/presentationml/2006/main">
+  <p:cSld>
+    <p:spTree>
+      <p:nvGrpSpPr>
+        <p:cNvPr id="1" name=""/>
+        <p:cNvGrpSpPr/>
+        <p:nvPr/>
+      </p:nvGrpSpPr>
+      <p:grpSpPr>
+        <a:xfrm>
+          <a:off x="0" y="0"/>
+          <a:ext cx="0" cy="0"/>
+          <a:chOff x="0" y="0"/>
+          <a:chExt cx="0" cy="0"/>
+        </a:xfrm>
+      </p:grpSpPr>
+      <p:sp>
+        <p:nvSpPr>
+          <p:cNvPr id="2" name="Título 1"/>
+          <p:cNvSpPr>
+            <a:spLocks noGrp="1"/>
+          </p:cNvSpPr>
+          <p:nvPr>
+            <p:ph type="title"/>
+          </p:nvPr>
+        </p:nvSpPr>
+        <p:spPr/>
+        <p:txBody>
+          <a:bodyPr/>
+          <a:lstStyle/>
+          <a:p>
+            <a:r>
+              <a:rPr lang="pt-BR" dirty="0" smtClean="0"/>
+              <a:t>SEGUNDA FORMA NORMAL</a:t>
+            </a:r>
+            <a:endParaRPr lang="pt-BR" dirty="0"/>
+          </a:p>
+        </p:txBody>
+      </p:sp>
+      <p:sp>
+        <p:nvSpPr>
+          <p:cNvPr id="3" name="Espaço Reservado para Conteúdo 2"/>
+          <p:cNvSpPr>
+            <a:spLocks noGrp="1"/>
+          </p:cNvSpPr>
+          <p:nvPr>
+            <p:ph idx="1"/>
+          </p:nvPr>
+        </p:nvSpPr>
+        <p:spPr>
+          <a:xfrm>
+            <a:off x="1371600" y="1428750"/>
+            <a:ext cx="9601200" cy="457200"/>
+          </a:xfrm>
+        </p:spPr>
+        <p:txBody>
+          <a:bodyPr/>
+          <a:lstStyle/>
+          <a:p>
+            <a:r>
+              <a:rPr lang="pt-BR" dirty="0" smtClean="0"/>
+              <a:t>Solução</a:t>
+            </a:r>
+            <a:endParaRPr lang="pt-BR" dirty="0"/>
+          </a:p>
+        </p:txBody>
+      </p:sp>
+    </p:spTree>
+    <p:extLst>
+      <p:ext uri="{BB962C8B-B14F-4D97-AF65-F5344CB8AC3E}">
+        <p14:creationId xmlns:p14="http://schemas.microsoft.com/office/powerpoint/2010/main" val="2927736604"/>
       </p:ext>
     </p:extLst>
   </p:cSld>

</xml_diff>

<commit_message>
Power Point e Docx atualizados
</commit_message>
<xml_diff>
--- a/Apresentação/Trabalho prático fundamentos de banco de dados 2018.pptx
+++ b/Apresentação/Trabalho prático fundamentos de banco de dados 2018.pptx
@@ -14,6 +14,9 @@
     <p:sldId id="262" r:id="rId8"/>
     <p:sldId id="263" r:id="rId9"/>
     <p:sldId id="264" r:id="rId10"/>
+    <p:sldId id="265" r:id="rId11"/>
+    <p:sldId id="266" r:id="rId12"/>
+    <p:sldId id="267" r:id="rId13"/>
   </p:sldIdLst>
   <p:sldSz cx="12192000" cy="6858000"/>
   <p:notesSz cx="6858000" cy="9144000"/>
@@ -3829,19 +3832,34 @@
       </p:sp>
       <p:sp>
         <p:nvSpPr>
-          <p:cNvPr id="3" name="Subtítulo 2"/>
-          <p:cNvSpPr>
-            <a:spLocks noGrp="1"/>
-          </p:cNvSpPr>
-          <p:nvPr>
-            <p:ph type="subTitle" idx="1"/>
-          </p:nvPr>
-        </p:nvSpPr>
-        <p:spPr/>
-        <p:txBody>
-          <a:bodyPr/>
+          <p:cNvPr id="4" name="CaixaDeTexto 3"/>
+          <p:cNvSpPr txBox="1"/>
+          <p:nvPr/>
+        </p:nvSpPr>
+        <p:spPr>
+          <a:xfrm>
+            <a:off x="3295650" y="3886680"/>
+            <a:ext cx="6362700" cy="369332"/>
+          </a:xfrm>
+          <a:prstGeom prst="rect">
+            <a:avLst/>
+          </a:prstGeom>
+          <a:noFill/>
+        </p:spPr>
+        <p:txBody>
+          <a:bodyPr wrap="square" rtlCol="0">
+            <a:spAutoFit/>
+          </a:bodyPr>
           <a:lstStyle/>
           <a:p>
+            <a:r>
+              <a:rPr lang="pt-BR" dirty="0" smtClean="0"/>
+              <a:t>Integrantes: Gabriel Gomes, Otávio Mello, Ricardo </a:t>
+            </a:r>
+            <a:r>
+              <a:rPr lang="pt-BR" dirty="0" err="1" smtClean="0"/>
+              <a:t>Kunde</a:t>
+            </a:r>
             <a:endParaRPr lang="pt-BR" dirty="0"/>
           </a:p>
         </p:txBody>
@@ -3850,6 +3868,922 @@
     <p:extLst>
       <p:ext uri="{BB962C8B-B14F-4D97-AF65-F5344CB8AC3E}">
         <p14:creationId xmlns:p14="http://schemas.microsoft.com/office/powerpoint/2010/main" val="3344094777"/>
+      </p:ext>
+    </p:extLst>
+  </p:cSld>
+  <p:clrMapOvr>
+    <a:masterClrMapping/>
+  </p:clrMapOvr>
+  <p:timing>
+    <p:tnLst>
+      <p:par>
+        <p:cTn id="1" dur="indefinite" restart="never" nodeType="tmRoot"/>
+      </p:par>
+    </p:tnLst>
+  </p:timing>
+</p:sld>
+</file>
+
+<file path=ppt/slides/slide10.xml><?xml version="1.0" encoding="utf-8"?>
+<p:sld xmlns:a="http://schemas.openxmlformats.org/drawingml/2006/main" xmlns:r="http://schemas.openxmlformats.org/officeDocument/2006/relationships" xmlns:p="http://schemas.openxmlformats.org/presentationml/2006/main">
+  <p:cSld>
+    <p:spTree>
+      <p:nvGrpSpPr>
+        <p:cNvPr id="1" name=""/>
+        <p:cNvGrpSpPr/>
+        <p:nvPr/>
+      </p:nvGrpSpPr>
+      <p:grpSpPr>
+        <a:xfrm>
+          <a:off x="0" y="0"/>
+          <a:ext cx="0" cy="0"/>
+          <a:chOff x="0" y="0"/>
+          <a:chExt cx="0" cy="0"/>
+        </a:xfrm>
+      </p:grpSpPr>
+      <p:sp>
+        <p:nvSpPr>
+          <p:cNvPr id="2" name="Título 1"/>
+          <p:cNvSpPr>
+            <a:spLocks noGrp="1"/>
+          </p:cNvSpPr>
+          <p:nvPr>
+            <p:ph type="title"/>
+          </p:nvPr>
+        </p:nvSpPr>
+        <p:spPr>
+          <a:xfrm>
+            <a:off x="1370991" y="553391"/>
+            <a:ext cx="9601200" cy="1485900"/>
+          </a:xfrm>
+        </p:spPr>
+        <p:txBody>
+          <a:bodyPr/>
+          <a:lstStyle/>
+          <a:p>
+            <a:pPr algn="ctr"/>
+            <a:r>
+              <a:rPr lang="pt-BR" dirty="0" smtClean="0"/>
+              <a:t>TERCEIRA FORMA NORMAL</a:t>
+            </a:r>
+            <a:endParaRPr lang="pt-BR" dirty="0"/>
+          </a:p>
+        </p:txBody>
+      </p:sp>
+      <p:sp>
+        <p:nvSpPr>
+          <p:cNvPr id="3" name="Espaço Reservado para Conteúdo 2"/>
+          <p:cNvSpPr>
+            <a:spLocks noGrp="1"/>
+          </p:cNvSpPr>
+          <p:nvPr>
+            <p:ph idx="1"/>
+          </p:nvPr>
+        </p:nvSpPr>
+        <p:spPr>
+          <a:xfrm>
+            <a:off x="1143000" y="1446990"/>
+            <a:ext cx="10382249" cy="2136669"/>
+          </a:xfrm>
+        </p:spPr>
+        <p:txBody>
+          <a:bodyPr/>
+          <a:lstStyle/>
+          <a:p>
+            <a:pPr marL="0" indent="0" algn="ctr">
+              <a:buNone/>
+            </a:pPr>
+            <a:r>
+              <a:rPr lang="pt-BR" b="1" dirty="0" smtClean="0"/>
+              <a:t>Modelo 3FN</a:t>
+            </a:r>
+          </a:p>
+          <a:p>
+            <a:pPr lvl="1" algn="just"/>
+            <a:r>
+              <a:rPr lang="pt-BR" dirty="0" smtClean="0"/>
+              <a:t>“Uma tabela encontra-se na terceira forma normal, quando</a:t>
+            </a:r>
+            <a:r>
+              <a:rPr lang="pt-BR" b="1" dirty="0" smtClean="0"/>
+              <a:t> está na 1FN e na 2FN</a:t>
+            </a:r>
+            <a:r>
+              <a:rPr lang="pt-BR" dirty="0" smtClean="0"/>
+              <a:t>, </a:t>
+            </a:r>
+            <a:r>
+              <a:rPr lang="pt-BR" b="1" dirty="0" smtClean="0"/>
+              <a:t>e não contém dependências transitivas</a:t>
+            </a:r>
+            <a:r>
+              <a:rPr lang="pt-BR" dirty="0" smtClean="0"/>
+              <a:t>.”</a:t>
+            </a:r>
+          </a:p>
+          <a:p>
+            <a:pPr lvl="1" algn="just"/>
+            <a:r>
+              <a:rPr lang="pt-BR" dirty="0" smtClean="0"/>
+              <a:t>“Dependências transitivas ocorrem </a:t>
+            </a:r>
+            <a:r>
+              <a:rPr lang="pt-BR" b="1" dirty="0" smtClean="0"/>
+              <a:t>quando uma coluna que não seja chave primária depende de outra que também não seja</a:t>
+            </a:r>
+            <a:r>
+              <a:rPr lang="pt-BR" dirty="0" smtClean="0"/>
+              <a:t>.”</a:t>
+            </a:r>
+          </a:p>
+        </p:txBody>
+      </p:sp>
+      <p:sp>
+        <p:nvSpPr>
+          <p:cNvPr id="4" name="CaixaDeTexto 3"/>
+          <p:cNvSpPr txBox="1"/>
+          <p:nvPr/>
+        </p:nvSpPr>
+        <p:spPr>
+          <a:xfrm>
+            <a:off x="5234130" y="3341253"/>
+            <a:ext cx="1989221" cy="369332"/>
+          </a:xfrm>
+          <a:prstGeom prst="rect">
+            <a:avLst/>
+          </a:prstGeom>
+          <a:noFill/>
+        </p:spPr>
+        <p:txBody>
+          <a:bodyPr wrap="square" rtlCol="0">
+            <a:spAutoFit/>
+          </a:bodyPr>
+          <a:lstStyle/>
+          <a:p>
+            <a:r>
+              <a:rPr lang="pt-BR" dirty="0" err="1" smtClean="0"/>
+              <a:t>Location</a:t>
+            </a:r>
+            <a:endParaRPr lang="pt-BR" dirty="0"/>
+          </a:p>
+        </p:txBody>
+      </p:sp>
+      <p:sp>
+        <p:nvSpPr>
+          <p:cNvPr id="9" name="CaixaDeTexto 8"/>
+          <p:cNvSpPr txBox="1"/>
+          <p:nvPr/>
+        </p:nvSpPr>
+        <p:spPr>
+          <a:xfrm>
+            <a:off x="6664304" y="3335572"/>
+            <a:ext cx="1989221" cy="369332"/>
+          </a:xfrm>
+          <a:prstGeom prst="rect">
+            <a:avLst/>
+          </a:prstGeom>
+          <a:noFill/>
+        </p:spPr>
+        <p:txBody>
+          <a:bodyPr wrap="square" rtlCol="0">
+            <a:spAutoFit/>
+          </a:bodyPr>
+          <a:lstStyle/>
+          <a:p>
+            <a:r>
+              <a:rPr lang="pt-BR" dirty="0" err="1" smtClean="0"/>
+              <a:t>Region</a:t>
+            </a:r>
+            <a:endParaRPr lang="pt-BR" dirty="0" smtClean="0"/>
+          </a:p>
+        </p:txBody>
+      </p:sp>
+      <p:sp>
+        <p:nvSpPr>
+          <p:cNvPr id="10" name="CaixaDeTexto 9"/>
+          <p:cNvSpPr txBox="1"/>
+          <p:nvPr/>
+        </p:nvSpPr>
+        <p:spPr>
+          <a:xfrm>
+            <a:off x="5451912" y="3924462"/>
+            <a:ext cx="1989221" cy="369332"/>
+          </a:xfrm>
+          <a:prstGeom prst="rect">
+            <a:avLst/>
+          </a:prstGeom>
+          <a:noFill/>
+        </p:spPr>
+        <p:txBody>
+          <a:bodyPr wrap="square" rtlCol="0">
+            <a:spAutoFit/>
+          </a:bodyPr>
+          <a:lstStyle/>
+          <a:p>
+            <a:r>
+              <a:rPr lang="pt-BR" dirty="0" err="1" smtClean="0"/>
+              <a:t>Year</a:t>
+            </a:r>
+            <a:endParaRPr lang="pt-BR" dirty="0"/>
+          </a:p>
+        </p:txBody>
+      </p:sp>
+      <p:sp>
+        <p:nvSpPr>
+          <p:cNvPr id="11" name="CaixaDeTexto 10"/>
+          <p:cNvSpPr txBox="1"/>
+          <p:nvPr/>
+        </p:nvSpPr>
+        <p:spPr>
+          <a:xfrm>
+            <a:off x="6664304" y="3930143"/>
+            <a:ext cx="1989221" cy="369332"/>
+          </a:xfrm>
+          <a:prstGeom prst="rect">
+            <a:avLst/>
+          </a:prstGeom>
+          <a:noFill/>
+        </p:spPr>
+        <p:txBody>
+          <a:bodyPr wrap="square" rtlCol="0">
+            <a:spAutoFit/>
+          </a:bodyPr>
+          <a:lstStyle/>
+          <a:p>
+            <a:r>
+              <a:rPr lang="pt-BR" dirty="0" smtClean="0"/>
+              <a:t>Summer</a:t>
+            </a:r>
+          </a:p>
+        </p:txBody>
+      </p:sp>
+      <p:cxnSp>
+        <p:nvCxnSpPr>
+          <p:cNvPr id="13" name="Conector de Seta Reta 12"/>
+          <p:cNvCxnSpPr/>
+          <p:nvPr/>
+        </p:nvCxnSpPr>
+        <p:spPr>
+          <a:xfrm>
+            <a:off x="6228741" y="3550354"/>
+            <a:ext cx="435563" cy="0"/>
+          </a:xfrm>
+          <a:prstGeom prst="straightConnector1">
+            <a:avLst/>
+          </a:prstGeom>
+          <a:ln>
+            <a:tailEnd type="triangle"/>
+          </a:ln>
+        </p:spPr>
+        <p:style>
+          <a:lnRef idx="2">
+            <a:schemeClr val="dk1"/>
+          </a:lnRef>
+          <a:fillRef idx="0">
+            <a:schemeClr val="dk1"/>
+          </a:fillRef>
+          <a:effectRef idx="1">
+            <a:schemeClr val="dk1"/>
+          </a:effectRef>
+          <a:fontRef idx="minor">
+            <a:schemeClr val="tx1"/>
+          </a:fontRef>
+        </p:style>
+      </p:cxnSp>
+      <p:cxnSp>
+        <p:nvCxnSpPr>
+          <p:cNvPr id="15" name="Conector de Seta Reta 14"/>
+          <p:cNvCxnSpPr/>
+          <p:nvPr/>
+        </p:nvCxnSpPr>
+        <p:spPr>
+          <a:xfrm>
+            <a:off x="6228741" y="4114809"/>
+            <a:ext cx="435563" cy="0"/>
+          </a:xfrm>
+          <a:prstGeom prst="straightConnector1">
+            <a:avLst/>
+          </a:prstGeom>
+          <a:ln>
+            <a:tailEnd type="triangle"/>
+          </a:ln>
+        </p:spPr>
+        <p:style>
+          <a:lnRef idx="2">
+            <a:schemeClr val="dk1"/>
+          </a:lnRef>
+          <a:fillRef idx="0">
+            <a:schemeClr val="dk1"/>
+          </a:fillRef>
+          <a:effectRef idx="1">
+            <a:schemeClr val="dk1"/>
+          </a:effectRef>
+          <a:fontRef idx="minor">
+            <a:schemeClr val="tx1"/>
+          </a:fontRef>
+        </p:style>
+      </p:cxnSp>
+      <p:sp>
+        <p:nvSpPr>
+          <p:cNvPr id="17" name="Espaço Reservado para Conteúdo 2"/>
+          <p:cNvSpPr txBox="1">
+            <a:spLocks/>
+          </p:cNvSpPr>
+          <p:nvPr/>
+        </p:nvSpPr>
+        <p:spPr>
+          <a:xfrm>
+            <a:off x="1806554" y="4608894"/>
+            <a:ext cx="9718695" cy="2136669"/>
+          </a:xfrm>
+          <a:prstGeom prst="rect">
+            <a:avLst/>
+          </a:prstGeom>
+        </p:spPr>
+        <p:txBody>
+          <a:bodyPr vert="horz" lIns="91440" tIns="45720" rIns="91440" bIns="45720" rtlCol="0">
+            <a:normAutofit/>
+          </a:bodyPr>
+          <a:lstStyle>
+            <a:lvl1pPr marL="384048" indent="-384048" algn="l" defTabSz="914400" rtl="0" eaLnBrk="1" latinLnBrk="0" hangingPunct="1">
+              <a:lnSpc>
+                <a:spcPct val="94000"/>
+              </a:lnSpc>
+              <a:spcBef>
+                <a:spcPts val="1000"/>
+              </a:spcBef>
+              <a:spcAft>
+                <a:spcPts val="200"/>
+              </a:spcAft>
+              <a:buFont typeface="Franklin Gothic Book" panose="020B0503020102020204" pitchFamily="34" charset="0"/>
+              <a:buChar char="■"/>
+              <a:defRPr sz="2000" kern="1200" baseline="0">
+                <a:solidFill>
+                  <a:schemeClr val="tx2"/>
+                </a:solidFill>
+                <a:latin typeface="+mn-lt"/>
+                <a:ea typeface="+mn-ea"/>
+                <a:cs typeface="+mn-cs"/>
+              </a:defRPr>
+            </a:lvl1pPr>
+            <a:lvl2pPr marL="914400" indent="-384048" algn="l" defTabSz="914400" rtl="0" eaLnBrk="1" latinLnBrk="0" hangingPunct="1">
+              <a:lnSpc>
+                <a:spcPct val="94000"/>
+              </a:lnSpc>
+              <a:spcBef>
+                <a:spcPts val="500"/>
+              </a:spcBef>
+              <a:spcAft>
+                <a:spcPts val="200"/>
+              </a:spcAft>
+              <a:buFont typeface="Franklin Gothic Book" panose="020B0503020102020204" pitchFamily="34" charset="0"/>
+              <a:buChar char="–"/>
+              <a:defRPr sz="2000" i="1" kern="1200" baseline="0">
+                <a:solidFill>
+                  <a:schemeClr val="tx2"/>
+                </a:solidFill>
+                <a:latin typeface="+mn-lt"/>
+                <a:ea typeface="+mn-ea"/>
+                <a:cs typeface="+mn-cs"/>
+              </a:defRPr>
+            </a:lvl2pPr>
+            <a:lvl3pPr marL="1371600" indent="-384048" algn="l" defTabSz="914400" rtl="0" eaLnBrk="1" latinLnBrk="0" hangingPunct="1">
+              <a:lnSpc>
+                <a:spcPct val="94000"/>
+              </a:lnSpc>
+              <a:spcBef>
+                <a:spcPts val="500"/>
+              </a:spcBef>
+              <a:spcAft>
+                <a:spcPts val="200"/>
+              </a:spcAft>
+              <a:buFont typeface="Franklin Gothic Book" panose="020B0503020102020204" pitchFamily="34" charset="0"/>
+              <a:buChar char="■"/>
+              <a:defRPr sz="1800" kern="1200" baseline="0">
+                <a:solidFill>
+                  <a:schemeClr val="tx2"/>
+                </a:solidFill>
+                <a:latin typeface="+mn-lt"/>
+                <a:ea typeface="+mn-ea"/>
+                <a:cs typeface="+mn-cs"/>
+              </a:defRPr>
+            </a:lvl3pPr>
+            <a:lvl4pPr marL="1828800" indent="-384048" algn="l" defTabSz="914400" rtl="0" eaLnBrk="1" latinLnBrk="0" hangingPunct="1">
+              <a:lnSpc>
+                <a:spcPct val="94000"/>
+              </a:lnSpc>
+              <a:spcBef>
+                <a:spcPts val="500"/>
+              </a:spcBef>
+              <a:spcAft>
+                <a:spcPts val="200"/>
+              </a:spcAft>
+              <a:buFont typeface="Franklin Gothic Book" panose="020B0503020102020204" pitchFamily="34" charset="0"/>
+              <a:buChar char="–"/>
+              <a:defRPr sz="1800" i="1" kern="1200" baseline="0">
+                <a:solidFill>
+                  <a:schemeClr val="tx2"/>
+                </a:solidFill>
+                <a:latin typeface="+mn-lt"/>
+                <a:ea typeface="+mn-ea"/>
+                <a:cs typeface="+mn-cs"/>
+              </a:defRPr>
+            </a:lvl4pPr>
+            <a:lvl5pPr marL="2286000" indent="-384048" algn="l" defTabSz="914400" rtl="0" eaLnBrk="1" latinLnBrk="0" hangingPunct="1">
+              <a:lnSpc>
+                <a:spcPct val="94000"/>
+              </a:lnSpc>
+              <a:spcBef>
+                <a:spcPts val="500"/>
+              </a:spcBef>
+              <a:spcAft>
+                <a:spcPts val="200"/>
+              </a:spcAft>
+              <a:buFont typeface="Franklin Gothic Book" panose="020B0503020102020204" pitchFamily="34" charset="0"/>
+              <a:buChar char="■"/>
+              <a:defRPr sz="1600" kern="1200" baseline="0">
+                <a:solidFill>
+                  <a:schemeClr val="tx2"/>
+                </a:solidFill>
+                <a:latin typeface="+mn-lt"/>
+                <a:ea typeface="+mn-ea"/>
+                <a:cs typeface="+mn-cs"/>
+              </a:defRPr>
+            </a:lvl5pPr>
+            <a:lvl6pPr marL="2743200" indent="-384048" algn="l" defTabSz="914400" rtl="0" eaLnBrk="1" latinLnBrk="0" hangingPunct="1">
+              <a:lnSpc>
+                <a:spcPct val="94000"/>
+              </a:lnSpc>
+              <a:spcBef>
+                <a:spcPts val="500"/>
+              </a:spcBef>
+              <a:spcAft>
+                <a:spcPts val="200"/>
+              </a:spcAft>
+              <a:buFont typeface="Franklin Gothic Book" panose="020B0503020102020204" pitchFamily="34" charset="0"/>
+              <a:buChar char="–"/>
+              <a:defRPr sz="1600" i="1" kern="1200" baseline="0">
+                <a:solidFill>
+                  <a:schemeClr val="tx2"/>
+                </a:solidFill>
+                <a:latin typeface="+mn-lt"/>
+                <a:ea typeface="+mn-ea"/>
+                <a:cs typeface="+mn-cs"/>
+              </a:defRPr>
+            </a:lvl6pPr>
+            <a:lvl7pPr marL="3200400" indent="-384048" algn="l" defTabSz="914400" rtl="0" eaLnBrk="1" latinLnBrk="0" hangingPunct="1">
+              <a:lnSpc>
+                <a:spcPct val="94000"/>
+              </a:lnSpc>
+              <a:spcBef>
+                <a:spcPts val="500"/>
+              </a:spcBef>
+              <a:spcAft>
+                <a:spcPts val="200"/>
+              </a:spcAft>
+              <a:buFont typeface="Franklin Gothic Book" panose="020B0503020102020204" pitchFamily="34" charset="0"/>
+              <a:buChar char="■"/>
+              <a:defRPr sz="1400" kern="1200" baseline="0">
+                <a:solidFill>
+                  <a:schemeClr val="tx2"/>
+                </a:solidFill>
+                <a:latin typeface="+mn-lt"/>
+                <a:ea typeface="+mn-ea"/>
+                <a:cs typeface="+mn-cs"/>
+              </a:defRPr>
+            </a:lvl7pPr>
+            <a:lvl8pPr marL="3657600" indent="-384048" algn="l" defTabSz="914400" rtl="0" eaLnBrk="1" latinLnBrk="0" hangingPunct="1">
+              <a:lnSpc>
+                <a:spcPct val="94000"/>
+              </a:lnSpc>
+              <a:spcBef>
+                <a:spcPts val="500"/>
+              </a:spcBef>
+              <a:spcAft>
+                <a:spcPts val="200"/>
+              </a:spcAft>
+              <a:buFont typeface="Franklin Gothic Book" panose="020B0503020102020204" pitchFamily="34" charset="0"/>
+              <a:buChar char="–"/>
+              <a:defRPr sz="1400" i="1" kern="1200" baseline="0">
+                <a:solidFill>
+                  <a:schemeClr val="tx2"/>
+                </a:solidFill>
+                <a:latin typeface="+mn-lt"/>
+                <a:ea typeface="+mn-ea"/>
+                <a:cs typeface="+mn-cs"/>
+              </a:defRPr>
+            </a:lvl8pPr>
+            <a:lvl9pPr marL="4114800" indent="-384048" algn="l" defTabSz="914400" rtl="0" eaLnBrk="1" latinLnBrk="0" hangingPunct="1">
+              <a:lnSpc>
+                <a:spcPct val="94000"/>
+              </a:lnSpc>
+              <a:spcBef>
+                <a:spcPts val="500"/>
+              </a:spcBef>
+              <a:spcAft>
+                <a:spcPts val="200"/>
+              </a:spcAft>
+              <a:buFont typeface="Franklin Gothic Book" panose="020B0503020102020204" pitchFamily="34" charset="0"/>
+              <a:buChar char="■"/>
+              <a:defRPr sz="1400" kern="1200" baseline="0">
+                <a:solidFill>
+                  <a:schemeClr val="tx2"/>
+                </a:solidFill>
+                <a:latin typeface="+mn-lt"/>
+                <a:ea typeface="+mn-ea"/>
+                <a:cs typeface="+mn-cs"/>
+              </a:defRPr>
+            </a:lvl9pPr>
+          </a:lstStyle>
+          <a:p>
+            <a:pPr marL="0" indent="0" algn="just">
+              <a:buFont typeface="Franklin Gothic Book" panose="020B0503020102020204" pitchFamily="34" charset="0"/>
+              <a:buNone/>
+            </a:pPr>
+            <a:r>
+              <a:rPr lang="pt-BR" dirty="0" smtClean="0"/>
+              <a:t>Em uma observação inicial obteve-se a ideia de que </a:t>
+            </a:r>
+            <a:r>
+              <a:rPr lang="pt-BR" dirty="0" err="1" smtClean="0"/>
+              <a:t>Year</a:t>
+            </a:r>
+            <a:r>
+              <a:rPr lang="pt-BR" dirty="0" smtClean="0"/>
+              <a:t> determina Summer (analisando a tabela), porém, com uma pesquisa sobre como funcionam as estações no universo de Game </a:t>
+            </a:r>
+            <a:r>
+              <a:rPr lang="pt-BR" dirty="0" err="1" smtClean="0"/>
+              <a:t>of</a:t>
+            </a:r>
+            <a:r>
+              <a:rPr lang="pt-BR" dirty="0" smtClean="0"/>
+              <a:t> </a:t>
+            </a:r>
+            <a:r>
+              <a:rPr lang="pt-BR" dirty="0" err="1" smtClean="0"/>
+              <a:t>Thrones</a:t>
+            </a:r>
+            <a:r>
+              <a:rPr lang="pt-BR" dirty="0" smtClean="0"/>
+              <a:t>, descobriu-se que suas durações são imprevisíveis e, logo, um verão poderia durar décadas ou meses. Dessa forma, optou-se por não considerar a segunda uma dependência transitiva.</a:t>
+            </a:r>
+          </a:p>
+        </p:txBody>
+      </p:sp>
+    </p:spTree>
+    <p:extLst>
+      <p:ext uri="{BB962C8B-B14F-4D97-AF65-F5344CB8AC3E}">
+        <p14:creationId xmlns:p14="http://schemas.microsoft.com/office/powerpoint/2010/main" val="3192426388"/>
+      </p:ext>
+    </p:extLst>
+  </p:cSld>
+  <p:clrMapOvr>
+    <a:masterClrMapping/>
+  </p:clrMapOvr>
+  <p:timing>
+    <p:tnLst>
+      <p:par>
+        <p:cTn id="1" dur="indefinite" restart="never" nodeType="tmRoot"/>
+      </p:par>
+    </p:tnLst>
+  </p:timing>
+</p:sld>
+</file>
+
+<file path=ppt/slides/slide11.xml><?xml version="1.0" encoding="utf-8"?>
+<p:sld xmlns:a="http://schemas.openxmlformats.org/drawingml/2006/main" xmlns:r="http://schemas.openxmlformats.org/officeDocument/2006/relationships" xmlns:p="http://schemas.openxmlformats.org/presentationml/2006/main">
+  <p:cSld>
+    <p:spTree>
+      <p:nvGrpSpPr>
+        <p:cNvPr id="1" name=""/>
+        <p:cNvGrpSpPr/>
+        <p:nvPr/>
+      </p:nvGrpSpPr>
+      <p:grpSpPr>
+        <a:xfrm>
+          <a:off x="0" y="0"/>
+          <a:ext cx="0" cy="0"/>
+          <a:chOff x="0" y="0"/>
+          <a:chExt cx="0" cy="0"/>
+        </a:xfrm>
+      </p:grpSpPr>
+      <p:sp>
+        <p:nvSpPr>
+          <p:cNvPr id="2" name="Título 1"/>
+          <p:cNvSpPr>
+            <a:spLocks noGrp="1"/>
+          </p:cNvSpPr>
+          <p:nvPr>
+            <p:ph type="title"/>
+          </p:nvPr>
+        </p:nvSpPr>
+        <p:spPr/>
+        <p:txBody>
+          <a:bodyPr/>
+          <a:lstStyle/>
+          <a:p>
+            <a:pPr algn="ctr"/>
+            <a:r>
+              <a:rPr lang="pt-BR" dirty="0" smtClean="0"/>
+              <a:t>TERCEIRA FORMA NORMAL</a:t>
+            </a:r>
+            <a:endParaRPr lang="pt-BR" dirty="0"/>
+          </a:p>
+        </p:txBody>
+      </p:sp>
+      <p:pic>
+        <p:nvPicPr>
+          <p:cNvPr id="15" name="Imagem 14"/>
+          <p:cNvPicPr>
+            <a:picLocks noChangeAspect="1"/>
+          </p:cNvPicPr>
+          <p:nvPr/>
+        </p:nvPicPr>
+        <p:blipFill rotWithShape="1">
+          <a:blip r:embed="rId2"/>
+          <a:srcRect l="31383" t="39967" r="31013" b="49781"/>
+          <a:stretch/>
+        </p:blipFill>
+        <p:spPr>
+          <a:xfrm>
+            <a:off x="2641568" y="1630504"/>
+            <a:ext cx="7061264" cy="1082391"/>
+          </a:xfrm>
+          <a:prstGeom prst="rect">
+            <a:avLst/>
+          </a:prstGeom>
+        </p:spPr>
+      </p:pic>
+      <p:sp>
+        <p:nvSpPr>
+          <p:cNvPr id="3" name="Retângulo 2"/>
+          <p:cNvSpPr/>
+          <p:nvPr/>
+        </p:nvSpPr>
+        <p:spPr>
+          <a:xfrm>
+            <a:off x="2641568" y="2457450"/>
+            <a:ext cx="654082" cy="255445"/>
+          </a:xfrm>
+          <a:prstGeom prst="rect">
+            <a:avLst/>
+          </a:prstGeom>
+          <a:solidFill>
+            <a:srgbClr val="FB1919">
+              <a:alpha val="60000"/>
+            </a:srgbClr>
+          </a:solidFill>
+          <a:ln>
+            <a:noFill/>
+          </a:ln>
+        </p:spPr>
+        <p:style>
+          <a:lnRef idx="2">
+            <a:schemeClr val="accent1">
+              <a:shade val="50000"/>
+            </a:schemeClr>
+          </a:lnRef>
+          <a:fillRef idx="1">
+            <a:schemeClr val="accent1"/>
+          </a:fillRef>
+          <a:effectRef idx="0">
+            <a:schemeClr val="accent1"/>
+          </a:effectRef>
+          <a:fontRef idx="minor">
+            <a:schemeClr val="lt1"/>
+          </a:fontRef>
+        </p:style>
+        <p:txBody>
+          <a:bodyPr rtlCol="0" anchor="ctr"/>
+          <a:lstStyle/>
+          <a:p>
+            <a:pPr algn="ctr"/>
+            <a:endParaRPr lang="pt-BR"/>
+          </a:p>
+        </p:txBody>
+      </p:sp>
+      <p:cxnSp>
+        <p:nvCxnSpPr>
+          <p:cNvPr id="7" name="Conector de Seta Reta 6"/>
+          <p:cNvCxnSpPr/>
+          <p:nvPr/>
+        </p:nvCxnSpPr>
+        <p:spPr>
+          <a:xfrm>
+            <a:off x="2946368" y="2712895"/>
+            <a:ext cx="0" cy="1042676"/>
+          </a:xfrm>
+          <a:prstGeom prst="straightConnector1">
+            <a:avLst/>
+          </a:prstGeom>
+          <a:ln w="9525" cap="flat" cmpd="sng" algn="ctr">
+            <a:solidFill>
+              <a:srgbClr val="FF0000"/>
+            </a:solidFill>
+            <a:prstDash val="solid"/>
+            <a:round/>
+            <a:headEnd type="none" w="med" len="med"/>
+            <a:tailEnd type="arrow" w="med" len="med"/>
+          </a:ln>
+        </p:spPr>
+        <p:style>
+          <a:lnRef idx="0">
+            <a:scrgbClr r="0" g="0" b="0"/>
+          </a:lnRef>
+          <a:fillRef idx="0">
+            <a:scrgbClr r="0" g="0" b="0"/>
+          </a:fillRef>
+          <a:effectRef idx="0">
+            <a:scrgbClr r="0" g="0" b="0"/>
+          </a:effectRef>
+          <a:fontRef idx="minor">
+            <a:schemeClr val="tx1"/>
+          </a:fontRef>
+        </p:style>
+      </p:cxnSp>
+      <p:pic>
+        <p:nvPicPr>
+          <p:cNvPr id="2050" name="Picture 2" descr="Image result for X PNG"/>
+          <p:cNvPicPr>
+            <a:picLocks noChangeAspect="1" noChangeArrowheads="1"/>
+          </p:cNvPicPr>
+          <p:nvPr/>
+        </p:nvPicPr>
+        <p:blipFill>
+          <a:blip r:embed="rId3">
+            <a:extLst>
+              <a:ext uri="{28A0092B-C50C-407E-A947-70E740481C1C}">
+                <a14:useLocalDpi xmlns:a14="http://schemas.microsoft.com/office/drawing/2010/main" val="0"/>
+              </a:ext>
+            </a:extLst>
+          </a:blip>
+          <a:srcRect/>
+          <a:stretch>
+            <a:fillRect/>
+          </a:stretch>
+        </p:blipFill>
+        <p:spPr bwMode="auto">
+          <a:xfrm>
+            <a:off x="2641568" y="2457450"/>
+            <a:ext cx="654082" cy="255446"/>
+          </a:xfrm>
+          <a:prstGeom prst="rect">
+            <a:avLst/>
+          </a:prstGeom>
+          <a:noFill/>
+          <a:extLst>
+            <a:ext uri="{909E8E84-426E-40DD-AFC4-6F175D3DCCD1}">
+              <a14:hiddenFill xmlns:a14="http://schemas.microsoft.com/office/drawing/2010/main">
+                <a:solidFill>
+                  <a:srgbClr val="FFFFFF"/>
+                </a:solidFill>
+              </a14:hiddenFill>
+            </a:ext>
+          </a:extLst>
+        </p:spPr>
+      </p:pic>
+      <p:pic>
+        <p:nvPicPr>
+          <p:cNvPr id="10" name="Imagem 9"/>
+          <p:cNvPicPr>
+            <a:picLocks noChangeAspect="1"/>
+          </p:cNvPicPr>
+          <p:nvPr/>
+        </p:nvPicPr>
+        <p:blipFill rotWithShape="1">
+          <a:blip r:embed="rId4"/>
+          <a:srcRect l="31359" t="37054" r="30489" b="45803"/>
+          <a:stretch/>
+        </p:blipFill>
+        <p:spPr>
+          <a:xfrm>
+            <a:off x="2670659" y="3878401"/>
+            <a:ext cx="7032173" cy="1776550"/>
+          </a:xfrm>
+          <a:prstGeom prst="rect">
+            <a:avLst/>
+          </a:prstGeom>
+        </p:spPr>
+      </p:pic>
+    </p:spTree>
+    <p:extLst>
+      <p:ext uri="{BB962C8B-B14F-4D97-AF65-F5344CB8AC3E}">
+        <p14:creationId xmlns:p14="http://schemas.microsoft.com/office/powerpoint/2010/main" val="1693441541"/>
+      </p:ext>
+    </p:extLst>
+  </p:cSld>
+  <p:clrMapOvr>
+    <a:masterClrMapping/>
+  </p:clrMapOvr>
+  <p:timing>
+    <p:tnLst>
+      <p:par>
+        <p:cTn id="1" dur="indefinite" restart="never" nodeType="tmRoot"/>
+      </p:par>
+    </p:tnLst>
+  </p:timing>
+</p:sld>
+</file>
+
+<file path=ppt/slides/slide12.xml><?xml version="1.0" encoding="utf-8"?>
+<p:sld xmlns:a="http://schemas.openxmlformats.org/drawingml/2006/main" xmlns:r="http://schemas.openxmlformats.org/officeDocument/2006/relationships" xmlns:p="http://schemas.openxmlformats.org/presentationml/2006/main">
+  <p:cSld>
+    <p:spTree>
+      <p:nvGrpSpPr>
+        <p:cNvPr id="1" name=""/>
+        <p:cNvGrpSpPr/>
+        <p:nvPr/>
+      </p:nvGrpSpPr>
+      <p:grpSpPr>
+        <a:xfrm>
+          <a:off x="0" y="0"/>
+          <a:ext cx="0" cy="0"/>
+          <a:chOff x="0" y="0"/>
+          <a:chExt cx="0" cy="0"/>
+        </a:xfrm>
+      </p:grpSpPr>
+      <p:sp>
+        <p:nvSpPr>
+          <p:cNvPr id="2" name="Título 1"/>
+          <p:cNvSpPr>
+            <a:spLocks noGrp="1"/>
+          </p:cNvSpPr>
+          <p:nvPr>
+            <p:ph type="title"/>
+          </p:nvPr>
+        </p:nvSpPr>
+        <p:spPr/>
+        <p:txBody>
+          <a:bodyPr/>
+          <a:lstStyle/>
+          <a:p>
+            <a:r>
+              <a:rPr lang="pt-BR" dirty="0" smtClean="0"/>
+              <a:t>TERCEIRA FORMA NORMAL</a:t>
+            </a:r>
+            <a:endParaRPr lang="pt-BR" dirty="0"/>
+          </a:p>
+        </p:txBody>
+      </p:sp>
+      <p:sp>
+        <p:nvSpPr>
+          <p:cNvPr id="3" name="Espaço Reservado para Conteúdo 2"/>
+          <p:cNvSpPr>
+            <a:spLocks noGrp="1"/>
+          </p:cNvSpPr>
+          <p:nvPr>
+            <p:ph idx="1"/>
+          </p:nvPr>
+        </p:nvSpPr>
+        <p:spPr>
+          <a:xfrm>
+            <a:off x="8439703" y="971550"/>
+            <a:ext cx="9601200" cy="457200"/>
+          </a:xfrm>
+        </p:spPr>
+        <p:txBody>
+          <a:bodyPr/>
+          <a:lstStyle/>
+          <a:p>
+            <a:pPr marL="0" indent="0">
+              <a:buNone/>
+            </a:pPr>
+            <a:r>
+              <a:rPr lang="pt-BR" i="1" dirty="0" smtClean="0"/>
+              <a:t>Solução</a:t>
+            </a:r>
+            <a:endParaRPr lang="pt-BR" i="1" dirty="0"/>
+          </a:p>
+        </p:txBody>
+      </p:sp>
+      <p:pic>
+        <p:nvPicPr>
+          <p:cNvPr id="4" name="Imagem 3"/>
+          <p:cNvPicPr>
+            <a:picLocks noChangeAspect="1"/>
+          </p:cNvPicPr>
+          <p:nvPr/>
+        </p:nvPicPr>
+        <p:blipFill rotWithShape="1">
+          <a:blip r:embed="rId2"/>
+          <a:srcRect l="32706" t="24448" r="31638" b="11581"/>
+          <a:stretch/>
+        </p:blipFill>
+        <p:spPr>
+          <a:xfrm>
+            <a:off x="3738282" y="1428750"/>
+            <a:ext cx="5298141" cy="5344213"/>
+          </a:xfrm>
+          <a:prstGeom prst="rect">
+            <a:avLst/>
+          </a:prstGeom>
+        </p:spPr>
+      </p:pic>
+    </p:spTree>
+    <p:extLst>
+      <p:ext uri="{BB962C8B-B14F-4D97-AF65-F5344CB8AC3E}">
+        <p14:creationId xmlns:p14="http://schemas.microsoft.com/office/powerpoint/2010/main" val="645992446"/>
       </p:ext>
     </p:extLst>
   </p:cSld>
@@ -3893,7 +4827,12 @@
             <p:ph type="title"/>
           </p:nvPr>
         </p:nvSpPr>
-        <p:spPr/>
+        <p:spPr>
+          <a:xfrm>
+            <a:off x="1371600" y="516900"/>
+            <a:ext cx="9601200" cy="1485900"/>
+          </a:xfrm>
+        </p:spPr>
         <p:txBody>
           <a:bodyPr/>
           <a:lstStyle/>
@@ -3918,7 +4857,7 @@
         </p:nvSpPr>
         <p:spPr>
           <a:xfrm>
-            <a:off x="1371600" y="2286000"/>
+            <a:off x="-1295400" y="1259850"/>
             <a:ext cx="9601200" cy="4216400"/>
           </a:xfrm>
         </p:spPr>
@@ -3928,23 +4867,34 @@
           </a:bodyPr>
           <a:lstStyle/>
           <a:p>
+            <a:pPr marL="0" indent="0" algn="ctr">
+              <a:buNone/>
+            </a:pPr>
+            <a:r>
+              <a:rPr lang="pt-BR" b="1" dirty="0" smtClean="0"/>
+              <a:t>Nome: </a:t>
+            </a:r>
             <a:r>
               <a:rPr lang="pt-BR" dirty="0" smtClean="0"/>
-              <a:t>Nome: Batalhas em Game </a:t>
-            </a:r>
-            <a:r>
-              <a:rPr lang="pt-BR" dirty="0" err="1" smtClean="0"/>
+              <a:t>Batalhas em </a:t>
+            </a:r>
+            <a:r>
+              <a:rPr lang="pt-BR" i="1" dirty="0" smtClean="0"/>
+              <a:t>Game </a:t>
+            </a:r>
+            <a:r>
+              <a:rPr lang="pt-BR" i="1" dirty="0" err="1" smtClean="0"/>
               <a:t>of</a:t>
             </a:r>
             <a:r>
-              <a:rPr lang="pt-BR" dirty="0" smtClean="0"/>
+              <a:rPr lang="pt-BR" i="1" dirty="0" smtClean="0"/>
               <a:t> </a:t>
             </a:r>
             <a:r>
-              <a:rPr lang="pt-BR" dirty="0" err="1" smtClean="0"/>
+              <a:rPr lang="pt-BR" i="1" dirty="0" err="1" smtClean="0"/>
               <a:t>Thrones</a:t>
             </a:r>
-            <a:endParaRPr lang="pt-BR" dirty="0" smtClean="0"/>
+            <a:endParaRPr lang="pt-BR" i="1" dirty="0" smtClean="0"/>
           </a:p>
           <a:p>
             <a:pPr lvl="1"/>
@@ -3978,12 +4928,53 @@
         </p:blipFill>
         <p:spPr>
           <a:xfrm>
-            <a:off x="1607113" y="2852751"/>
+            <a:off x="1450007" y="2170752"/>
             <a:ext cx="9912917" cy="3649649"/>
           </a:xfrm>
           <a:prstGeom prst="rect">
             <a:avLst/>
           </a:prstGeom>
+        </p:spPr>
+      </p:pic>
+      <p:pic>
+        <p:nvPicPr>
+          <p:cNvPr id="1026" name="Picture 2" descr="Image result for game of thrones logo"/>
+          <p:cNvPicPr>
+            <a:picLocks noChangeAspect="1" noChangeArrowheads="1"/>
+          </p:cNvPicPr>
+          <p:nvPr/>
+        </p:nvPicPr>
+        <p:blipFill>
+          <a:blip r:embed="rId3">
+            <a:extLst>
+              <a:ext uri="{28A0092B-C50C-407E-A947-70E740481C1C}">
+                <a14:useLocalDpi xmlns:a14="http://schemas.microsoft.com/office/drawing/2010/main" val="0"/>
+              </a:ext>
+            </a:extLst>
+          </a:blip>
+          <a:srcRect/>
+          <a:stretch>
+            <a:fillRect/>
+          </a:stretch>
+        </p:blipFill>
+        <p:spPr bwMode="auto">
+          <a:xfrm>
+            <a:off x="7990435" y="516900"/>
+            <a:ext cx="2822001" cy="1246760"/>
+          </a:xfrm>
+          <a:prstGeom prst="rect">
+            <a:avLst/>
+          </a:prstGeom>
+          <a:noFill/>
+          <a:extLst>
+            <a:ext uri="{909E8E84-426E-40DD-AFC4-6F175D3DCCD1}">
+              <a14:hiddenFill xmlns:a14="http://schemas.microsoft.com/office/drawing/2010/main">
+                <a:solidFill>
+                  <a:srgbClr val="FFFFFF"/>
+                </a:solidFill>
+              </a14:hiddenFill>
+            </a:ext>
+          </a:extLst>
         </p:spPr>
       </p:pic>
     </p:spTree>
@@ -4058,7 +5049,7 @@
         </p:nvSpPr>
         <p:spPr>
           <a:xfrm>
-            <a:off x="928468" y="2820573"/>
+            <a:off x="6495079" y="1587891"/>
             <a:ext cx="11099409" cy="583809"/>
           </a:xfrm>
         </p:spPr>
@@ -4070,15 +5061,15 @@
               <a:buNone/>
             </a:pPr>
             <a:r>
-              <a:rPr lang="pt-BR" sz="2800" dirty="0" smtClean="0"/>
+              <a:rPr lang="pt-BR" sz="2800" i="1" dirty="0" smtClean="0"/>
               <a:t>Modelo </a:t>
             </a:r>
             <a:r>
-              <a:rPr lang="pt-BR" sz="2800" dirty="0" err="1" smtClean="0"/>
+              <a:rPr lang="pt-BR" sz="2800" i="1" dirty="0" err="1" smtClean="0"/>
               <a:t>desnormalizado</a:t>
             </a:r>
             <a:r>
-              <a:rPr lang="pt-BR" sz="2800" dirty="0" smtClean="0"/>
+              <a:rPr lang="pt-BR" sz="2800" i="1" dirty="0" smtClean="0"/>
               <a:t> ÑN </a:t>
             </a:r>
           </a:p>
@@ -4086,7 +5077,7 @@
             <a:pPr marL="0" indent="0">
               <a:buNone/>
             </a:pPr>
-            <a:endParaRPr lang="pt-BR" dirty="0"/>
+            <a:endParaRPr lang="pt-BR" i="1" dirty="0"/>
           </a:p>
         </p:txBody>
       </p:sp>
@@ -4112,7 +5103,7 @@
         </p:blipFill>
         <p:spPr>
           <a:xfrm>
-            <a:off x="1371600" y="3842240"/>
+            <a:off x="1618060" y="2914650"/>
             <a:ext cx="9108280" cy="1756702"/>
           </a:xfrm>
           <a:prstGeom prst="rect">
@@ -4167,16 +5158,22 @@
             <p:ph type="title"/>
           </p:nvPr>
         </p:nvSpPr>
-        <p:spPr/>
+        <p:spPr>
+          <a:xfrm>
+            <a:off x="1735358" y="517343"/>
+            <a:ext cx="9601200" cy="1485900"/>
+          </a:xfrm>
+        </p:spPr>
         <p:txBody>
           <a:bodyPr/>
           <a:lstStyle/>
           <a:p>
-            <a:r>
-              <a:rPr lang="pt-BR" b="1" dirty="0" smtClean="0"/>
+            <a:pPr algn="ctr"/>
+            <a:r>
+              <a:rPr lang="pt-BR" dirty="0" smtClean="0"/>
               <a:t>PRIMEIRA FORMA NORMAL</a:t>
             </a:r>
-            <a:endParaRPr lang="pt-BR" b="1" dirty="0"/>
+            <a:endParaRPr lang="pt-BR" dirty="0"/>
           </a:p>
         </p:txBody>
       </p:sp>
@@ -4192,41 +5189,66 @@
         </p:nvSpPr>
         <p:spPr>
           <a:xfrm>
-            <a:off x="1259058" y="1473200"/>
-            <a:ext cx="9601200" cy="1229555"/>
+            <a:off x="1215189" y="1478485"/>
+            <a:ext cx="10158663" cy="1673847"/>
           </a:xfrm>
         </p:spPr>
         <p:txBody>
           <a:bodyPr>
-            <a:normAutofit fontScale="77500" lnSpcReduction="20000"/>
+            <a:normAutofit fontScale="92500" lnSpcReduction="10000"/>
           </a:bodyPr>
           <a:lstStyle/>
           <a:p>
-            <a:r>
-              <a:rPr lang="pt-BR" dirty="0" smtClean="0"/>
+            <a:pPr marL="0" indent="0" algn="ctr">
+              <a:buNone/>
+            </a:pPr>
+            <a:r>
+              <a:rPr lang="pt-BR" b="1" dirty="0" smtClean="0"/>
               <a:t>Modelo 1FN</a:t>
             </a:r>
           </a:p>
           <a:p>
-            <a:pPr lvl="1"/>
-            <a:r>
-              <a:rPr lang="pt-BR" dirty="0" smtClean="0"/>
-              <a:t>“Diz-se que uma tabela está na primeira forma normal, quando ela não contém tabelas aninhadas</a:t>
-            </a:r>
-            <a:r>
-              <a:rPr lang="pt-BR" dirty="0" smtClean="0"/>
-              <a:t>”</a:t>
-            </a:r>
-          </a:p>
-          <a:p>
-            <a:pPr marL="530352" lvl="1" indent="0">
+            <a:pPr marL="530352" lvl="1" indent="0" algn="just">
               <a:buNone/>
             </a:pPr>
             <a:r>
-              <a:rPr lang="pt-BR" dirty="0" smtClean="0"/>
-              <a:t>-Todos os atributos devem sem atômicos ou seja a tabela não deve conter grupos repetidos e nem atributos com mais de um valor.</a:t>
-            </a:r>
-            <a:endParaRPr lang="pt-BR" dirty="0"/>
+              <a:rPr lang="pt-BR" sz="2300" dirty="0" smtClean="0"/>
+              <a:t>- “Diz-se que uma tabela está na primeira forma normal, </a:t>
+            </a:r>
+            <a:r>
+              <a:rPr lang="pt-BR" sz="2300" b="1" dirty="0" smtClean="0"/>
+              <a:t>quando ela não contém tabelas aninhadas</a:t>
+            </a:r>
+            <a:r>
+              <a:rPr lang="pt-BR" sz="2300" dirty="0" smtClean="0"/>
+              <a:t>.”</a:t>
+            </a:r>
+          </a:p>
+          <a:p>
+            <a:pPr marL="530352" lvl="1" indent="0" algn="just">
+              <a:buNone/>
+            </a:pPr>
+            <a:r>
+              <a:rPr lang="pt-BR" sz="2300" dirty="0" smtClean="0"/>
+              <a:t>- ”Todos os atributos </a:t>
+            </a:r>
+            <a:r>
+              <a:rPr lang="pt-BR" sz="2300" b="1" dirty="0" smtClean="0"/>
+              <a:t>devem ser atômicos </a:t>
+            </a:r>
+            <a:r>
+              <a:rPr lang="pt-BR" sz="2300" dirty="0" smtClean="0"/>
+              <a:t>ou seja a tabela </a:t>
+            </a:r>
+            <a:r>
+              <a:rPr lang="pt-BR" sz="2300" b="1" dirty="0" smtClean="0"/>
+              <a:t>não deve conter grupos repetidos e nem atributos com mais de um valo</a:t>
+            </a:r>
+            <a:r>
+              <a:rPr lang="pt-BR" sz="2300" dirty="0" smtClean="0"/>
+              <a:t>r.”</a:t>
+            </a:r>
+            <a:endParaRPr lang="pt-BR" sz="2300" dirty="0"/>
           </a:p>
           <a:p>
             <a:pPr lvl="1"/>
@@ -4242,8 +5264,8 @@
         </p:nvSpPr>
         <p:spPr>
           <a:xfrm>
-            <a:off x="1371600" y="2748474"/>
-            <a:ext cx="9687104" cy="646331"/>
+            <a:off x="1735358" y="3226668"/>
+            <a:ext cx="9237442" cy="646331"/>
           </a:xfrm>
           <a:prstGeom prst="rect">
             <a:avLst/>
@@ -4256,7 +5278,7 @@
           </a:bodyPr>
           <a:lstStyle/>
           <a:p>
-            <a:pPr algn="just"/>
+            <a:pPr algn="ctr"/>
             <a:r>
               <a:rPr lang="pt-BR" dirty="0" smtClean="0"/>
               <a:t>Durante essa etapa, na tabela, foram identificadas colunas com atributos multivalorados, assim desobedecendo a condição para estar na primeira forma normal.</a:t>
@@ -4287,7 +5309,7 @@
         </p:blipFill>
         <p:spPr>
           <a:xfrm>
-            <a:off x="1735357" y="3809412"/>
+            <a:off x="2119214" y="4091191"/>
             <a:ext cx="8853586" cy="1859868"/>
           </a:xfrm>
           <a:prstGeom prst="rect">
@@ -4344,7 +5366,7 @@
         </p:nvSpPr>
         <p:spPr>
           <a:xfrm>
-            <a:off x="1499815" y="341141"/>
+            <a:off x="1592179" y="341141"/>
             <a:ext cx="9601200" cy="663685"/>
           </a:xfrm>
         </p:spPr>
@@ -4354,6 +5376,7 @@
           </a:bodyPr>
           <a:lstStyle/>
           <a:p>
+            <a:pPr algn="ctr"/>
             <a:r>
               <a:rPr lang="pt-BR" sz="3200" b="1" dirty="0" smtClean="0"/>
               <a:t>COLUNAS COM ATRIBUTOS MULTIVALORADOS</a:t>
@@ -4372,7 +5395,7 @@
             <p:ph idx="1"/>
           </p:nvPr>
         </p:nvPicPr>
-        <p:blipFill>
+        <p:blipFill rotWithShape="1">
           <a:blip r:embed="rId2">
             <a:extLst>
               <a:ext uri="{28A0092B-C50C-407E-A947-70E740481C1C}">
@@ -4380,14 +5403,13 @@
               </a:ext>
             </a:extLst>
           </a:blip>
-          <a:stretch>
-            <a:fillRect/>
-          </a:stretch>
+          <a:srcRect l="1468" t="4113" r="1664" b="3608"/>
+          <a:stretch/>
         </p:blipFill>
         <p:spPr>
           <a:xfrm>
-            <a:off x="4434176" y="3778811"/>
-            <a:ext cx="3924887" cy="2903170"/>
+            <a:off x="4491789" y="3898232"/>
+            <a:ext cx="3801980" cy="2679032"/>
           </a:xfrm>
         </p:spPr>
       </p:pic>
@@ -4399,7 +5421,7 @@
           </p:cNvPicPr>
           <p:nvPr/>
         </p:nvPicPr>
-        <p:blipFill>
+        <p:blipFill rotWithShape="1">
           <a:blip r:embed="rId3">
             <a:extLst>
               <a:ext uri="{28A0092B-C50C-407E-A947-70E740481C1C}">
@@ -4407,14 +5429,13 @@
               </a:ext>
             </a:extLst>
           </a:blip>
-          <a:stretch>
-            <a:fillRect/>
-          </a:stretch>
+          <a:srcRect l="942" t="2012" r="1830" b="2904"/>
+          <a:stretch/>
         </p:blipFill>
         <p:spPr>
           <a:xfrm>
-            <a:off x="1499815" y="1096266"/>
-            <a:ext cx="9793611" cy="2499665"/>
+            <a:off x="1251284" y="1004826"/>
+            <a:ext cx="10540162" cy="2630905"/>
           </a:xfrm>
           <a:prstGeom prst="rect">
             <a:avLst/>
@@ -4493,7 +5514,7 @@
         </p:nvSpPr>
         <p:spPr>
           <a:xfrm>
-            <a:off x="1371600" y="1677572"/>
+            <a:off x="8125326" y="1027820"/>
             <a:ext cx="9601200" cy="400930"/>
           </a:xfrm>
         </p:spPr>
@@ -4503,8 +5524,11 @@
           </a:bodyPr>
           <a:lstStyle/>
           <a:p>
-            <a:r>
-              <a:rPr lang="pt-BR" dirty="0" smtClean="0"/>
+            <a:pPr marL="0" indent="0">
+              <a:buNone/>
+            </a:pPr>
+            <a:r>
+              <a:rPr lang="pt-BR" i="1" dirty="0" smtClean="0"/>
               <a:t>Solução adotada</a:t>
             </a:r>
           </a:p>
@@ -4512,10 +5536,33 @@
             <a:pPr marL="0" indent="0">
               <a:buNone/>
             </a:pPr>
-            <a:endParaRPr lang="pt-BR" dirty="0"/>
-          </a:p>
-        </p:txBody>
-      </p:sp>
+            <a:endParaRPr lang="pt-BR" i="1" dirty="0"/>
+          </a:p>
+        </p:txBody>
+      </p:sp>
+      <p:pic>
+        <p:nvPicPr>
+          <p:cNvPr id="7" name="Imagem 6"/>
+          <p:cNvPicPr>
+            <a:picLocks noChangeAspect="1"/>
+          </p:cNvPicPr>
+          <p:nvPr/>
+        </p:nvPicPr>
+        <p:blipFill rotWithShape="1">
+          <a:blip r:embed="rId2"/>
+          <a:srcRect l="31383" t="39967" r="31013" b="18586"/>
+          <a:stretch/>
+        </p:blipFill>
+        <p:spPr>
+          <a:xfrm>
+            <a:off x="2711118" y="1588746"/>
+            <a:ext cx="7636042" cy="4731843"/>
+          </a:xfrm>
+          <a:prstGeom prst="rect">
+            <a:avLst/>
+          </a:prstGeom>
+        </p:spPr>
+      </p:pic>
     </p:spTree>
     <p:extLst>
       <p:ext uri="{BB962C8B-B14F-4D97-AF65-F5344CB8AC3E}">
@@ -4563,7 +5610,12 @@
             <p:ph type="title"/>
           </p:nvPr>
         </p:nvSpPr>
-        <p:spPr/>
+        <p:spPr>
+          <a:xfrm>
+            <a:off x="1370991" y="553391"/>
+            <a:ext cx="9601200" cy="1485900"/>
+          </a:xfrm>
+        </p:spPr>
         <p:txBody>
           <a:bodyPr/>
           <a:lstStyle/>
@@ -4588,7 +5640,7 @@
         </p:nvSpPr>
         <p:spPr>
           <a:xfrm>
-            <a:off x="1270000" y="1428750"/>
+            <a:off x="1310239" y="1296341"/>
             <a:ext cx="9601200" cy="2044700"/>
           </a:xfrm>
         </p:spPr>
@@ -4596,23 +5648,50 @@
           <a:bodyPr/>
           <a:lstStyle/>
           <a:p>
+            <a:pPr marL="0" indent="0" algn="ctr">
+              <a:buNone/>
+            </a:pPr>
+            <a:r>
+              <a:rPr lang="pt-BR" b="1" dirty="0" smtClean="0"/>
+              <a:t>Modelo 2FN</a:t>
+            </a:r>
+          </a:p>
+          <a:p>
+            <a:pPr lvl="1" algn="just"/>
             <a:r>
               <a:rPr lang="pt-BR" dirty="0" smtClean="0"/>
-              <a:t>Modelo 2FN</a:t>
-            </a:r>
-          </a:p>
-          <a:p>
-            <a:pPr lvl="1"/>
+              <a:t>“Uma tabela encontra-se na segunda forma normal, quando, </a:t>
+            </a:r>
+            <a:r>
+              <a:rPr lang="pt-BR" b="1" dirty="0" smtClean="0"/>
+              <a:t>além de estar na 1FN</a:t>
+            </a:r>
             <a:r>
               <a:rPr lang="pt-BR" dirty="0" smtClean="0"/>
-              <a:t>“Uma tabela encontra-se na segunda forma normal, quando, além de estar na 1FN, não contém dependências parciais.”</a:t>
-            </a:r>
-          </a:p>
-          <a:p>
-            <a:pPr lvl="1"/>
+              <a:t>, </a:t>
+            </a:r>
+            <a:r>
+              <a:rPr lang="pt-BR" b="1" dirty="0" smtClean="0"/>
+              <a:t>não contém dependências parciais</a:t>
+            </a:r>
             <a:r>
               <a:rPr lang="pt-BR" dirty="0" smtClean="0"/>
-              <a:t>“Dependências parciais ocorrem quando uma coluna depende apenas de parte de uma chave primária composta.”</a:t>
+              <a:t>.”</a:t>
+            </a:r>
+          </a:p>
+          <a:p>
+            <a:pPr lvl="1" algn="just"/>
+            <a:r>
+              <a:rPr lang="pt-BR" dirty="0" smtClean="0"/>
+              <a:t>“Dependências parciais ocorrem </a:t>
+            </a:r>
+            <a:r>
+              <a:rPr lang="pt-BR" b="1" dirty="0" smtClean="0"/>
+              <a:t>quando uma coluna depende apenas de parte de uma chave primária composta</a:t>
+            </a:r>
+            <a:r>
+              <a:rPr lang="pt-BR" dirty="0" smtClean="0"/>
+              <a:t>.”</a:t>
             </a:r>
           </a:p>
         </p:txBody>
@@ -4625,7 +5704,7 @@
         </p:nvSpPr>
         <p:spPr>
           <a:xfrm>
-            <a:off x="9697985" y="3180402"/>
+            <a:off x="9697985" y="3217834"/>
             <a:ext cx="914400" cy="914400"/>
           </a:xfrm>
           <a:prstGeom prst="smileyFace">
@@ -4682,8 +5761,8 @@
         </p:blipFill>
         <p:spPr>
           <a:xfrm>
-            <a:off x="3343563" y="4300621"/>
-            <a:ext cx="5439534" cy="2429214"/>
+            <a:off x="3552110" y="4393681"/>
+            <a:ext cx="5238963" cy="2339642"/>
           </a:xfrm>
           <a:prstGeom prst="rect">
             <a:avLst/>
@@ -4698,7 +5777,7 @@
         </p:nvSpPr>
         <p:spPr>
           <a:xfrm>
-            <a:off x="9187530" y="5058028"/>
+            <a:off x="9697985" y="5094901"/>
             <a:ext cx="914400" cy="914400"/>
           </a:xfrm>
           <a:prstGeom prst="smileyFace">
@@ -4740,6 +5819,29 @@
           </a:p>
         </p:txBody>
       </p:sp>
+      <p:pic>
+        <p:nvPicPr>
+          <p:cNvPr id="8" name="Imagem 7"/>
+          <p:cNvPicPr>
+            <a:picLocks noChangeAspect="1"/>
+          </p:cNvPicPr>
+          <p:nvPr/>
+        </p:nvPicPr>
+        <p:blipFill rotWithShape="1">
+          <a:blip r:embed="rId3"/>
+          <a:srcRect l="31383" t="39967" r="31013" b="49781"/>
+          <a:stretch/>
+        </p:blipFill>
+        <p:spPr>
+          <a:xfrm>
+            <a:off x="3015916" y="3200626"/>
+            <a:ext cx="6189846" cy="948815"/>
+          </a:xfrm>
+          <a:prstGeom prst="rect">
+            <a:avLst/>
+          </a:prstGeom>
+        </p:spPr>
+      </p:pic>
     </p:spTree>
     <p:extLst>
       <p:ext uri="{BB962C8B-B14F-4D97-AF65-F5344CB8AC3E}">
@@ -4809,7 +5911,7 @@
         </p:nvGrpSpPr>
         <p:grpSpPr>
           <a:xfrm>
-            <a:off x="3593262" y="1643014"/>
+            <a:off x="3641389" y="1569072"/>
             <a:ext cx="5059254" cy="1205255"/>
             <a:chOff x="1371600" y="1689821"/>
             <a:chExt cx="4045527" cy="963757"/>
@@ -4899,7 +6001,7 @@
         </p:nvGrpSpPr>
         <p:grpSpPr>
           <a:xfrm>
-            <a:off x="3581350" y="3026229"/>
+            <a:off x="3629477" y="2952287"/>
             <a:ext cx="5086327" cy="851327"/>
             <a:chOff x="1362075" y="2795880"/>
             <a:chExt cx="4067176" cy="680746"/>
@@ -4989,7 +6091,7 @@
         </p:nvGrpSpPr>
         <p:grpSpPr>
           <a:xfrm>
-            <a:off x="2785693" y="4198964"/>
+            <a:off x="2833820" y="4125022"/>
             <a:ext cx="7016034" cy="845371"/>
             <a:chOff x="1371600" y="3638522"/>
             <a:chExt cx="5610226" cy="675983"/>
@@ -5079,7 +6181,7 @@
         </p:nvGrpSpPr>
         <p:grpSpPr>
           <a:xfrm>
-            <a:off x="2773781" y="5220715"/>
+            <a:off x="2821908" y="5146773"/>
             <a:ext cx="7027946" cy="866829"/>
             <a:chOff x="1362075" y="4455544"/>
             <a:chExt cx="5619751" cy="693142"/>
@@ -5233,7 +6335,7 @@
         </p:nvSpPr>
         <p:spPr>
           <a:xfrm>
-            <a:off x="1371600" y="1428750"/>
+            <a:off x="8094244" y="971550"/>
             <a:ext cx="9601200" cy="457200"/>
           </a:xfrm>
         </p:spPr>
@@ -5241,14 +6343,40 @@
           <a:bodyPr/>
           <a:lstStyle/>
           <a:p>
-            <a:r>
-              <a:rPr lang="pt-BR" dirty="0" smtClean="0"/>
+            <a:pPr marL="0" indent="0">
+              <a:buNone/>
+            </a:pPr>
+            <a:r>
+              <a:rPr lang="pt-BR" i="1" dirty="0" smtClean="0"/>
               <a:t>Solução</a:t>
             </a:r>
-            <a:endParaRPr lang="pt-BR" dirty="0"/>
-          </a:p>
-        </p:txBody>
-      </p:sp>
+            <a:endParaRPr lang="pt-BR" i="1" dirty="0"/>
+          </a:p>
+        </p:txBody>
+      </p:sp>
+      <p:pic>
+        <p:nvPicPr>
+          <p:cNvPr id="5" name="Imagem 4"/>
+          <p:cNvPicPr>
+            <a:picLocks noChangeAspect="1"/>
+          </p:cNvPicPr>
+          <p:nvPr/>
+        </p:nvPicPr>
+        <p:blipFill rotWithShape="1">
+          <a:blip r:embed="rId2"/>
+          <a:srcRect l="56890" t="28125" r="8385" b="15993"/>
+          <a:stretch/>
+        </p:blipFill>
+        <p:spPr>
+          <a:xfrm>
+            <a:off x="3617259" y="1428750"/>
+            <a:ext cx="5647765" cy="5109884"/>
+          </a:xfrm>
+          <a:prstGeom prst="rect">
+            <a:avLst/>
+          </a:prstGeom>
+        </p:spPr>
+      </p:pic>
     </p:spTree>
     <p:extLst>
       <p:ext uri="{BB962C8B-B14F-4D97-AF65-F5344CB8AC3E}">

</xml_diff>

<commit_message>
editando arquivo de esquema
</commit_message>
<xml_diff>
--- a/Apresentação/Trabalho prático fundamentos de banco de dados 2018.pptx
+++ b/Apresentação/Trabalho prático fundamentos de banco de dados 2018.pptx
@@ -300,7 +300,7 @@
             <a:fld id="{87DE6118-2437-4B30-8E3C-4D2BE6020583}" type="datetimeFigureOut">
               <a:rPr lang="en-US" dirty="0"/>
               <a:pPr/>
-              <a:t>6/20/2018</a:t>
+              <a:t>6/22/2018</a:t>
             </a:fld>
             <a:endParaRPr lang="en-US" dirty="0"/>
           </a:p>
@@ -626,7 +626,7 @@
           <a:p>
             <a:fld id="{87DE6118-2437-4B30-8E3C-4D2BE6020583}" type="datetimeFigureOut">
               <a:rPr lang="en-US" dirty="0"/>
-              <a:t>6/20/2018</a:t>
+              <a:t>6/22/2018</a:t>
             </a:fld>
             <a:endParaRPr lang="en-US" dirty="0"/>
           </a:p>
@@ -801,7 +801,7 @@
           <a:p>
             <a:fld id="{87DE6118-2437-4B30-8E3C-4D2BE6020583}" type="datetimeFigureOut">
               <a:rPr lang="en-US" dirty="0"/>
-              <a:t>6/20/2018</a:t>
+              <a:t>6/22/2018</a:t>
             </a:fld>
             <a:endParaRPr lang="en-US" dirty="0"/>
           </a:p>
@@ -966,7 +966,7 @@
           <a:p>
             <a:fld id="{87DE6118-2437-4B30-8E3C-4D2BE6020583}" type="datetimeFigureOut">
               <a:rPr lang="en-US" dirty="0"/>
-              <a:t>6/20/2018</a:t>
+              <a:t>6/22/2018</a:t>
             </a:fld>
             <a:endParaRPr lang="en-US" dirty="0"/>
           </a:p>
@@ -1239,7 +1239,7 @@
             <a:fld id="{87DE6118-2437-4B30-8E3C-4D2BE6020583}" type="datetimeFigureOut">
               <a:rPr lang="en-US" dirty="0"/>
               <a:pPr/>
-              <a:t>6/20/2018</a:t>
+              <a:t>6/22/2018</a:t>
             </a:fld>
             <a:endParaRPr lang="en-US" dirty="0"/>
           </a:p>
@@ -1629,7 +1629,7 @@
           <a:p>
             <a:fld id="{87DE6118-2437-4B30-8E3C-4D2BE6020583}" type="datetimeFigureOut">
               <a:rPr lang="en-US" dirty="0"/>
-              <a:t>6/20/2018</a:t>
+              <a:t>6/22/2018</a:t>
             </a:fld>
             <a:endParaRPr lang="en-US" dirty="0"/>
           </a:p>
@@ -2101,7 +2101,7 @@
           <a:p>
             <a:fld id="{87DE6118-2437-4B30-8E3C-4D2BE6020583}" type="datetimeFigureOut">
               <a:rPr lang="en-US" dirty="0"/>
-              <a:t>6/20/2018</a:t>
+              <a:t>6/22/2018</a:t>
             </a:fld>
             <a:endParaRPr lang="en-US" dirty="0"/>
           </a:p>
@@ -2214,7 +2214,7 @@
           <a:p>
             <a:fld id="{87DE6118-2437-4B30-8E3C-4D2BE6020583}" type="datetimeFigureOut">
               <a:rPr lang="en-US" dirty="0"/>
-              <a:t>6/20/2018</a:t>
+              <a:t>6/22/2018</a:t>
             </a:fld>
             <a:endParaRPr lang="en-US" dirty="0"/>
           </a:p>
@@ -2304,7 +2304,7 @@
           <a:p>
             <a:fld id="{87DE6118-2437-4B30-8E3C-4D2BE6020583}" type="datetimeFigureOut">
               <a:rPr lang="en-US" dirty="0"/>
-              <a:t>6/20/2018</a:t>
+              <a:t>6/22/2018</a:t>
             </a:fld>
             <a:endParaRPr lang="en-US" dirty="0"/>
           </a:p>
@@ -2646,7 +2646,7 @@
             <a:fld id="{87DE6118-2437-4B30-8E3C-4D2BE6020583}" type="datetimeFigureOut">
               <a:rPr lang="en-US" dirty="0"/>
               <a:pPr/>
-              <a:t>6/20/2018</a:t>
+              <a:t>6/22/2018</a:t>
             </a:fld>
             <a:endParaRPr lang="en-US" dirty="0"/>
           </a:p>
@@ -2919,7 +2919,7 @@
           </a:lstStyle>
           <a:p>
             <a:r>
-              <a:rPr lang="pt-BR" smtClean="0"/>
+              <a:rPr lang="pt-BR" dirty="0" smtClean="0"/>
               <a:t>Clique no ícone para adicionar uma imagem</a:t>
             </a:r>
             <a:endParaRPr lang="en-US" dirty="0"/>
@@ -3031,7 +3031,7 @@
             <a:fld id="{87DE6118-2437-4B30-8E3C-4D2BE6020583}" type="datetimeFigureOut">
               <a:rPr lang="en-US" dirty="0"/>
               <a:pPr/>
-              <a:t>6/20/2018</a:t>
+              <a:t>6/22/2018</a:t>
             </a:fld>
             <a:endParaRPr lang="en-US" dirty="0"/>
           </a:p>
@@ -3306,7 +3306,7 @@
             <a:fld id="{87DE6118-2437-4B30-8E3C-4D2BE6020583}" type="datetimeFigureOut">
               <a:rPr lang="en-US" dirty="0"/>
               <a:pPr/>
-              <a:t>6/20/2018</a:t>
+              <a:t>6/22/2018</a:t>
             </a:fld>
             <a:endParaRPr lang="en-US" dirty="0"/>
           </a:p>
@@ -3837,15 +3837,7 @@
             <a:pPr algn="r"/>
             <a:r>
               <a:rPr lang="pt-BR" sz="3600" b="1" dirty="0" smtClean="0"/>
-              <a:t>Trabalho </a:t>
-            </a:r>
-            <a:r>
-              <a:rPr lang="pt-BR" sz="3600" b="1" dirty="0" smtClean="0"/>
-              <a:t>prático de </a:t>
-            </a:r>
-            <a:r>
-              <a:rPr lang="pt-BR" sz="3600" b="1" dirty="0" smtClean="0"/>
-              <a:t>fundamentos de banco de dados 2018/1</a:t>
+              <a:t>Trabalho prático de fundamentos de banco de dados 2018/1</a:t>
             </a:r>
             <a:endParaRPr lang="pt-BR" sz="3600" b="1" dirty="0"/>
           </a:p>
@@ -3875,11 +3867,7 @@
           <a:p>
             <a:r>
               <a:rPr lang="pt-BR" dirty="0" smtClean="0"/>
-              <a:t>Integrantes: Gabriel Gomes, Otávio Mello, Ricardo </a:t>
-            </a:r>
-            <a:r>
-              <a:rPr lang="pt-BR" dirty="0" err="1" smtClean="0"/>
-              <a:t>Kunde</a:t>
+              <a:t>Integrantes: Gabriel Gomes, Otávio Mello, Ricardo Kunde</a:t>
             </a:r>
             <a:endParaRPr lang="pt-BR" dirty="0"/>
           </a:p>
@@ -4311,7 +4299,7 @@
           <a:lstStyle/>
           <a:p>
             <a:r>
-              <a:rPr lang="pt-BR" dirty="0" err="1" smtClean="0"/>
+              <a:rPr lang="pt-BR" dirty="0" smtClean="0"/>
               <a:t>Year</a:t>
             </a:r>
             <a:endParaRPr lang="pt-BR" dirty="0"/>
@@ -4602,34 +4590,13 @@
               <a:t>Em uma observação inicial obteve-se a ideia de que </a:t>
             </a:r>
             <a:r>
-              <a:rPr lang="pt-BR" dirty="0" err="1" smtClean="0"/>
+              <a:rPr lang="pt-BR" dirty="0" smtClean="0"/>
               <a:t>Year</a:t>
             </a:r>
             <a:r>
               <a:rPr lang="pt-BR" dirty="0" smtClean="0"/>
-              <a:t> determina Summer (analisando a tabela), porém, com uma pesquisa sobre como funcionam as estações no universo de Game </a:t>
-            </a:r>
-            <a:r>
-              <a:rPr lang="pt-BR" dirty="0" err="1" smtClean="0"/>
-              <a:t>of</a:t>
-            </a:r>
-            <a:r>
-              <a:rPr lang="pt-BR" dirty="0" smtClean="0"/>
-              <a:t> </a:t>
-            </a:r>
-            <a:r>
-              <a:rPr lang="pt-BR" dirty="0" err="1" smtClean="0"/>
-              <a:t>Thrones</a:t>
-            </a:r>
-            <a:r>
-              <a:rPr lang="pt-BR" dirty="0" smtClean="0"/>
-              <a:t>, descobriu-se que suas durações são imprevisíveis e, logo, um verão poderia durar décadas ou meses. Dessa forma, optou-se por </a:t>
-            </a:r>
-            <a:r>
-              <a:rPr lang="pt-BR" dirty="0" smtClean="0"/>
-              <a:t>não considera-la uma dependência transitiva.</a:t>
-            </a:r>
-            <a:endParaRPr lang="pt-BR" dirty="0" smtClean="0"/>
+              <a:t> determina Summer (analisando a tabela), porém, com uma pesquisa sobre como funcionam as estações no universo de Game of Thrones, descobriu-se que suas durações são imprevisíveis e, logo, um verão poderia durar décadas ou meses. Dessa forma, optou-se por não considera-la uma dependência transitiva.</a:t>
+            </a:r>
           </a:p>
         </p:txBody>
       </p:sp>
@@ -4758,7 +4725,7 @@
           <a:lstStyle/>
           <a:p>
             <a:pPr algn="ctr"/>
-            <a:endParaRPr lang="pt-BR"/>
+            <a:endParaRPr lang="pt-BR" dirty="0"/>
           </a:p>
         </p:txBody>
       </p:sp>
@@ -4798,7 +4765,7 @@
           <a:lstStyle/>
           <a:p>
             <a:pPr algn="ctr"/>
-            <a:endParaRPr lang="pt-BR"/>
+            <a:endParaRPr lang="pt-BR" dirty="0"/>
           </a:p>
         </p:txBody>
       </p:sp>
@@ -4848,7 +4815,7 @@
           <a:lstStyle/>
           <a:p>
             <a:pPr algn="ctr"/>
-            <a:endParaRPr lang="pt-BR"/>
+            <a:endParaRPr lang="pt-BR" dirty="0"/>
           </a:p>
         </p:txBody>
       </p:sp>
@@ -5192,7 +5159,7 @@
           <a:p>
             <a:pPr algn="just"/>
             <a:r>
-              <a:rPr lang="pt-BR" sz="1400" dirty="0" err="1" smtClean="0"/>
+              <a:rPr lang="pt-BR" sz="1400" dirty="0" smtClean="0"/>
               <a:t>Location</a:t>
             </a:r>
             <a:r>
@@ -5269,7 +5236,7 @@
               </a:spcAft>
             </a:pPr>
             <a:r>
-              <a:rPr lang="en-US" sz="2000" dirty="0" err="1"/>
+              <a:rPr lang="en-US" sz="2000" dirty="0"/>
               <a:t>location_battle</a:t>
             </a:r>
             <a:r>
@@ -5277,7 +5244,7 @@
               <a:t>(</a:t>
             </a:r>
             <a:r>
-              <a:rPr lang="en-US" sz="2000" b="1" u="sng" dirty="0" err="1"/>
+              <a:rPr lang="en-US" sz="2000" b="1" u="sng" dirty="0"/>
               <a:t>battle_number</a:t>
             </a:r>
             <a:r>
@@ -5285,7 +5252,7 @@
               <a:t>, </a:t>
             </a:r>
             <a:r>
-              <a:rPr lang="en-US" sz="2000" b="1" u="sng" dirty="0" err="1"/>
+              <a:rPr lang="en-US" sz="2000" b="1" u="sng" dirty="0"/>
               <a:t>id_region</a:t>
             </a:r>
             <a:r>
@@ -5293,7 +5260,7 @@
               <a:t>,  </a:t>
             </a:r>
             <a:r>
-              <a:rPr lang="en-US" sz="2000" dirty="0" err="1"/>
+              <a:rPr lang="en-US" sz="2000" dirty="0"/>
               <a:t>id_location</a:t>
             </a:r>
             <a:r>
@@ -5461,7 +5428,7 @@
           <a:lstStyle/>
           <a:p>
             <a:pPr algn="ctr"/>
-            <a:endParaRPr lang="pt-BR"/>
+            <a:endParaRPr lang="pt-BR" dirty="0"/>
           </a:p>
         </p:txBody>
       </p:sp>
@@ -5534,7 +5501,7 @@
               <a:t>Remove </a:t>
             </a:r>
             <a:r>
-              <a:rPr lang="pt-BR" sz="2000" dirty="0" err="1" smtClean="0"/>
+              <a:rPr lang="pt-BR" sz="2000" dirty="0" smtClean="0"/>
               <a:t>region</a:t>
             </a:r>
             <a:r>
@@ -5542,7 +5509,7 @@
               <a:t> da tabela </a:t>
             </a:r>
             <a:r>
-              <a:rPr lang="pt-BR" sz="2000" dirty="0" err="1" smtClean="0"/>
+              <a:rPr lang="pt-BR" sz="2000" dirty="0" smtClean="0"/>
               <a:t>battles</a:t>
             </a:r>
             <a:r>
@@ -5612,31 +5579,7 @@
                 <a:ea typeface="Calibri" panose="020F0502020204030204" pitchFamily="34" charset="0"/>
                 <a:cs typeface="Times New Roman" panose="02020603050405020304" pitchFamily="18" charset="0"/>
               </a:rPr>
-              <a:t>Game </a:t>
-            </a:r>
-            <a:r>
-              <a:rPr lang="pt-BR" i="1" dirty="0" err="1">
-                <a:latin typeface="Bahnschrift Light" panose="020B0502040204020203" pitchFamily="34" charset="0"/>
-                <a:ea typeface="Calibri" panose="020F0502020204030204" pitchFamily="34" charset="0"/>
-                <a:cs typeface="Times New Roman" panose="02020603050405020304" pitchFamily="18" charset="0"/>
-              </a:rPr>
-              <a:t>of</a:t>
-            </a:r>
-            <a:r>
-              <a:rPr lang="pt-BR" i="1" dirty="0">
-                <a:latin typeface="Bahnschrift Light" panose="020B0502040204020203" pitchFamily="34" charset="0"/>
-                <a:ea typeface="Calibri" panose="020F0502020204030204" pitchFamily="34" charset="0"/>
-                <a:cs typeface="Times New Roman" panose="02020603050405020304" pitchFamily="18" charset="0"/>
-              </a:rPr>
-              <a:t> </a:t>
-            </a:r>
-            <a:r>
-              <a:rPr lang="pt-BR" i="1" dirty="0" err="1">
-                <a:latin typeface="Bahnschrift Light" panose="020B0502040204020203" pitchFamily="34" charset="0"/>
-                <a:ea typeface="Calibri" panose="020F0502020204030204" pitchFamily="34" charset="0"/>
-                <a:cs typeface="Times New Roman" panose="02020603050405020304" pitchFamily="18" charset="0"/>
-              </a:rPr>
-              <a:t>Thrones</a:t>
+              <a:t>Game of Thrones</a:t>
             </a:r>
             <a:r>
               <a:rPr lang="pt-BR" dirty="0">
@@ -6168,21 +6111,8 @@
             </a:r>
             <a:r>
               <a:rPr lang="pt-BR" i="1" dirty="0" smtClean="0"/>
-              <a:t>Game </a:t>
-            </a:r>
-            <a:r>
-              <a:rPr lang="pt-BR" i="1" dirty="0" err="1" smtClean="0"/>
-              <a:t>of</a:t>
-            </a:r>
-            <a:r>
-              <a:rPr lang="pt-BR" i="1" dirty="0" smtClean="0"/>
-              <a:t> </a:t>
-            </a:r>
-            <a:r>
-              <a:rPr lang="pt-BR" i="1" dirty="0" err="1" smtClean="0"/>
-              <a:t>Thrones</a:t>
-            </a:r>
-            <a:endParaRPr lang="pt-BR" i="1" dirty="0" smtClean="0"/>
+              <a:t>Game of Thrones</a:t>
+            </a:r>
           </a:p>
           <a:p>
             <a:pPr lvl="1"/>
@@ -6350,15 +6280,7 @@
             </a:pPr>
             <a:r>
               <a:rPr lang="pt-BR" sz="2800" i="1" dirty="0" smtClean="0"/>
-              <a:t>Modelo </a:t>
-            </a:r>
-            <a:r>
-              <a:rPr lang="pt-BR" sz="2800" i="1" dirty="0" err="1" smtClean="0"/>
-              <a:t>desnormalizado</a:t>
-            </a:r>
-            <a:r>
-              <a:rPr lang="pt-BR" sz="2800" i="1" dirty="0" smtClean="0"/>
-              <a:t> ÑN </a:t>
+              <a:t>Modelo desnormalizado ÑN </a:t>
             </a:r>
           </a:p>
           <a:p>
@@ -6645,7 +6567,7 @@
           <a:lstStyle/>
           <a:p>
             <a:pPr algn="ctr"/>
-            <a:endParaRPr lang="pt-BR"/>
+            <a:endParaRPr lang="pt-BR" dirty="0"/>
           </a:p>
         </p:txBody>
       </p:sp>
@@ -7097,7 +7019,7 @@
         </p:nvSpPr>
         <p:spPr>
           <a:xfrm>
-            <a:off x="9697985" y="3217834"/>
+            <a:off x="9371413" y="3169591"/>
             <a:ext cx="914400" cy="914400"/>
           </a:xfrm>
           <a:prstGeom prst="smileyFace">
@@ -7128,7 +7050,7 @@
           <a:lstStyle/>
           <a:p>
             <a:pPr algn="ctr"/>
-            <a:endParaRPr lang="pt-BR"/>
+            <a:endParaRPr lang="pt-BR" dirty="0"/>
           </a:p>
         </p:txBody>
       </p:sp>
@@ -7140,7 +7062,7 @@
         </p:nvSpPr>
         <p:spPr>
           <a:xfrm>
-            <a:off x="9697985" y="5094901"/>
+            <a:off x="9371413" y="5020654"/>
             <a:ext cx="914400" cy="914400"/>
           </a:xfrm>
           <a:prstGeom prst="smileyFace">
@@ -7178,7 +7100,7 @@
           <a:lstStyle/>
           <a:p>
             <a:pPr algn="ctr"/>
-            <a:endParaRPr lang="pt-BR"/>
+            <a:endParaRPr lang="pt-BR" dirty="0"/>
           </a:p>
         </p:txBody>
       </p:sp>
@@ -7228,6 +7150,66 @@
           </a:prstGeom>
         </p:spPr>
       </p:pic>
+      <p:sp>
+        <p:nvSpPr>
+          <p:cNvPr id="6" name="CaixaDeTexto 5"/>
+          <p:cNvSpPr txBox="1"/>
+          <p:nvPr/>
+        </p:nvSpPr>
+        <p:spPr>
+          <a:xfrm>
+            <a:off x="10411097" y="3433877"/>
+            <a:ext cx="1624149" cy="369332"/>
+          </a:xfrm>
+          <a:prstGeom prst="rect">
+            <a:avLst/>
+          </a:prstGeom>
+          <a:noFill/>
+        </p:spPr>
+        <p:txBody>
+          <a:bodyPr wrap="square" rtlCol="0">
+            <a:spAutoFit/>
+          </a:bodyPr>
+          <a:lstStyle/>
+          <a:p>
+            <a:r>
+              <a:rPr lang="pt-BR" dirty="0" smtClean="0"/>
+              <a:t>Está na 2FN!</a:t>
+            </a:r>
+            <a:endParaRPr lang="pt-BR" dirty="0"/>
+          </a:p>
+        </p:txBody>
+      </p:sp>
+      <p:sp>
+        <p:nvSpPr>
+          <p:cNvPr id="10" name="CaixaDeTexto 9"/>
+          <p:cNvSpPr txBox="1"/>
+          <p:nvPr/>
+        </p:nvSpPr>
+        <p:spPr>
+          <a:xfrm>
+            <a:off x="10411096" y="5197795"/>
+            <a:ext cx="1624149" cy="646331"/>
+          </a:xfrm>
+          <a:prstGeom prst="rect">
+            <a:avLst/>
+          </a:prstGeom>
+          <a:noFill/>
+        </p:spPr>
+        <p:txBody>
+          <a:bodyPr wrap="square" rtlCol="0">
+            <a:spAutoFit/>
+          </a:bodyPr>
+          <a:lstStyle/>
+          <a:p>
+            <a:r>
+              <a:rPr lang="pt-BR" dirty="0" smtClean="0"/>
+              <a:t>Não estão na 2FN!</a:t>
+            </a:r>
+            <a:endParaRPr lang="pt-BR" dirty="0"/>
+          </a:p>
+        </p:txBody>
+      </p:sp>
     </p:spTree>
     <p:extLst>
       <p:ext uri="{BB962C8B-B14F-4D97-AF65-F5344CB8AC3E}">
@@ -7437,6 +7419,310 @@
               <a:t>As tabelas abaixo geradas após a 1FN possuem dependência parcial.</a:t>
             </a:r>
             <a:endParaRPr lang="pt-BR" i="1" dirty="0"/>
+          </a:p>
+        </p:txBody>
+      </p:sp>
+      <p:sp>
+        <p:nvSpPr>
+          <p:cNvPr id="8" name="Retângulo 7"/>
+          <p:cNvSpPr/>
+          <p:nvPr/>
+        </p:nvSpPr>
+        <p:spPr>
+          <a:xfrm>
+            <a:off x="3790831" y="2622234"/>
+            <a:ext cx="900232" cy="345107"/>
+          </a:xfrm>
+          <a:prstGeom prst="rect">
+            <a:avLst/>
+          </a:prstGeom>
+          <a:solidFill>
+            <a:srgbClr val="FFC000"/>
+          </a:solidFill>
+          <a:ln>
+            <a:noFill/>
+          </a:ln>
+        </p:spPr>
+        <p:style>
+          <a:lnRef idx="2">
+            <a:schemeClr val="accent1">
+              <a:shade val="50000"/>
+            </a:schemeClr>
+          </a:lnRef>
+          <a:fillRef idx="1">
+            <a:schemeClr val="accent1"/>
+          </a:fillRef>
+          <a:effectRef idx="0">
+            <a:schemeClr val="accent1"/>
+          </a:effectRef>
+          <a:fontRef idx="minor">
+            <a:schemeClr val="lt1"/>
+          </a:fontRef>
+        </p:style>
+        <p:txBody>
+          <a:bodyPr rtlCol="0" anchor="ctr"/>
+          <a:lstStyle/>
+          <a:p>
+            <a:pPr algn="ctr"/>
+            <a:endParaRPr lang="pt-BR" dirty="0"/>
+          </a:p>
+        </p:txBody>
+      </p:sp>
+      <p:sp>
+        <p:nvSpPr>
+          <p:cNvPr id="10" name="Retângulo 9"/>
+          <p:cNvSpPr/>
+          <p:nvPr/>
+        </p:nvSpPr>
+        <p:spPr>
+          <a:xfrm>
+            <a:off x="3841843" y="4300878"/>
+            <a:ext cx="1504857" cy="263814"/>
+          </a:xfrm>
+          <a:prstGeom prst="rect">
+            <a:avLst/>
+          </a:prstGeom>
+          <a:solidFill>
+            <a:srgbClr val="FFC000"/>
+          </a:solidFill>
+          <a:ln>
+            <a:noFill/>
+          </a:ln>
+        </p:spPr>
+        <p:style>
+          <a:lnRef idx="2">
+            <a:schemeClr val="accent1">
+              <a:shade val="50000"/>
+            </a:schemeClr>
+          </a:lnRef>
+          <a:fillRef idx="1">
+            <a:schemeClr val="accent1"/>
+          </a:fillRef>
+          <a:effectRef idx="0">
+            <a:schemeClr val="accent1"/>
+          </a:effectRef>
+          <a:fontRef idx="minor">
+            <a:schemeClr val="lt1"/>
+          </a:fontRef>
+        </p:style>
+        <p:txBody>
+          <a:bodyPr rtlCol="0" anchor="ctr"/>
+          <a:lstStyle/>
+          <a:p>
+            <a:pPr algn="ctr"/>
+            <a:endParaRPr lang="pt-BR" dirty="0"/>
+          </a:p>
+        </p:txBody>
+      </p:sp>
+      <p:sp>
+        <p:nvSpPr>
+          <p:cNvPr id="11" name="Retângulo 10"/>
+          <p:cNvSpPr/>
+          <p:nvPr/>
+        </p:nvSpPr>
+        <p:spPr>
+          <a:xfrm>
+            <a:off x="9150350" y="2632499"/>
+            <a:ext cx="920749" cy="334842"/>
+          </a:xfrm>
+          <a:prstGeom prst="rect">
+            <a:avLst/>
+          </a:prstGeom>
+          <a:solidFill>
+            <a:srgbClr val="FFC000"/>
+          </a:solidFill>
+          <a:ln>
+            <a:noFill/>
+          </a:ln>
+        </p:spPr>
+        <p:style>
+          <a:lnRef idx="2">
+            <a:schemeClr val="accent1">
+              <a:shade val="50000"/>
+            </a:schemeClr>
+          </a:lnRef>
+          <a:fillRef idx="1">
+            <a:schemeClr val="accent1"/>
+          </a:fillRef>
+          <a:effectRef idx="0">
+            <a:schemeClr val="accent1"/>
+          </a:effectRef>
+          <a:fontRef idx="minor">
+            <a:schemeClr val="lt1"/>
+          </a:fontRef>
+        </p:style>
+        <p:txBody>
+          <a:bodyPr rtlCol="0" anchor="ctr"/>
+          <a:lstStyle/>
+          <a:p>
+            <a:pPr algn="ctr"/>
+            <a:endParaRPr lang="pt-BR" dirty="0"/>
+          </a:p>
+        </p:txBody>
+      </p:sp>
+      <p:sp>
+        <p:nvSpPr>
+          <p:cNvPr id="12" name="Retângulo 11"/>
+          <p:cNvSpPr/>
+          <p:nvPr/>
+        </p:nvSpPr>
+        <p:spPr>
+          <a:xfrm>
+            <a:off x="9150350" y="4345328"/>
+            <a:ext cx="1504857" cy="263814"/>
+          </a:xfrm>
+          <a:prstGeom prst="rect">
+            <a:avLst/>
+          </a:prstGeom>
+          <a:solidFill>
+            <a:srgbClr val="FFC000"/>
+          </a:solidFill>
+          <a:ln>
+            <a:noFill/>
+          </a:ln>
+        </p:spPr>
+        <p:style>
+          <a:lnRef idx="2">
+            <a:schemeClr val="accent1">
+              <a:shade val="50000"/>
+            </a:schemeClr>
+          </a:lnRef>
+          <a:fillRef idx="1">
+            <a:schemeClr val="accent1"/>
+          </a:fillRef>
+          <a:effectRef idx="0">
+            <a:schemeClr val="accent1"/>
+          </a:effectRef>
+          <a:fontRef idx="minor">
+            <a:schemeClr val="lt1"/>
+          </a:fontRef>
+        </p:style>
+        <p:txBody>
+          <a:bodyPr rtlCol="0" anchor="ctr"/>
+          <a:lstStyle/>
+          <a:p>
+            <a:pPr algn="ctr"/>
+            <a:endParaRPr lang="pt-BR" dirty="0"/>
+          </a:p>
+        </p:txBody>
+      </p:sp>
+      <p:sp>
+        <p:nvSpPr>
+          <p:cNvPr id="13" name="CaixaDeTexto 12"/>
+          <p:cNvSpPr txBox="1"/>
+          <p:nvPr/>
+        </p:nvSpPr>
+        <p:spPr>
+          <a:xfrm>
+            <a:off x="3727496" y="2632499"/>
+            <a:ext cx="1733550" cy="276999"/>
+          </a:xfrm>
+          <a:prstGeom prst="rect">
+            <a:avLst/>
+          </a:prstGeom>
+          <a:noFill/>
+        </p:spPr>
+        <p:txBody>
+          <a:bodyPr wrap="square" rtlCol="0">
+            <a:spAutoFit/>
+          </a:bodyPr>
+          <a:lstStyle/>
+          <a:p>
+            <a:r>
+              <a:rPr lang="pt-BR" sz="1200" dirty="0" smtClean="0"/>
+              <a:t>attacker_king</a:t>
+            </a:r>
+            <a:endParaRPr lang="pt-BR" sz="1200" dirty="0"/>
+          </a:p>
+        </p:txBody>
+      </p:sp>
+      <p:sp>
+        <p:nvSpPr>
+          <p:cNvPr id="14" name="CaixaDeTexto 13"/>
+          <p:cNvSpPr txBox="1"/>
+          <p:nvPr/>
+        </p:nvSpPr>
+        <p:spPr>
+          <a:xfrm>
+            <a:off x="9085402" y="2651487"/>
+            <a:ext cx="1733550" cy="261610"/>
+          </a:xfrm>
+          <a:prstGeom prst="rect">
+            <a:avLst/>
+          </a:prstGeom>
+          <a:noFill/>
+        </p:spPr>
+        <p:txBody>
+          <a:bodyPr wrap="square" rtlCol="0">
+            <a:spAutoFit/>
+          </a:bodyPr>
+          <a:lstStyle/>
+          <a:p>
+            <a:r>
+              <a:rPr lang="pt-BR" sz="1100" dirty="0" err="1" smtClean="0"/>
+              <a:t>defender_king</a:t>
+            </a:r>
+            <a:endParaRPr lang="pt-BR" sz="1100" dirty="0"/>
+          </a:p>
+        </p:txBody>
+      </p:sp>
+      <p:sp>
+        <p:nvSpPr>
+          <p:cNvPr id="15" name="CaixaDeTexto 14"/>
+          <p:cNvSpPr txBox="1"/>
+          <p:nvPr/>
+        </p:nvSpPr>
+        <p:spPr>
+          <a:xfrm>
+            <a:off x="9085402" y="4323986"/>
+            <a:ext cx="1733550" cy="276999"/>
+          </a:xfrm>
+          <a:prstGeom prst="rect">
+            <a:avLst/>
+          </a:prstGeom>
+          <a:noFill/>
+        </p:spPr>
+        <p:txBody>
+          <a:bodyPr wrap="square" rtlCol="0">
+            <a:spAutoFit/>
+          </a:bodyPr>
+          <a:lstStyle/>
+          <a:p>
+            <a:r>
+              <a:rPr lang="pt-BR" sz="1200" dirty="0" err="1" smtClean="0"/>
+              <a:t>defender_commander</a:t>
+            </a:r>
+            <a:endParaRPr lang="pt-BR" sz="1200" dirty="0"/>
+          </a:p>
+        </p:txBody>
+      </p:sp>
+      <p:sp>
+        <p:nvSpPr>
+          <p:cNvPr id="16" name="CaixaDeTexto 15"/>
+          <p:cNvSpPr txBox="1"/>
+          <p:nvPr/>
+        </p:nvSpPr>
+        <p:spPr>
+          <a:xfrm>
+            <a:off x="3814011" y="4270086"/>
+            <a:ext cx="1733550" cy="276999"/>
+          </a:xfrm>
+          <a:prstGeom prst="rect">
+            <a:avLst/>
+          </a:prstGeom>
+          <a:noFill/>
+        </p:spPr>
+        <p:txBody>
+          <a:bodyPr wrap="square" rtlCol="0">
+            <a:spAutoFit/>
+          </a:bodyPr>
+          <a:lstStyle/>
+          <a:p>
+            <a:r>
+              <a:rPr lang="pt-BR" sz="1200" dirty="0" err="1" smtClean="0"/>
+              <a:t>attacker_commander</a:t>
+            </a:r>
+            <a:endParaRPr lang="pt-BR" sz="1200" dirty="0"/>
           </a:p>
         </p:txBody>
       </p:sp>

</xml_diff>